<commit_message>
Simple LSTM model added
</commit_message>
<xml_diff>
--- a/Stock Price Prediction.pptx
+++ b/Stock Price Prediction.pptx
@@ -21,6 +21,7 @@
     <p:sldId id="266" r:id="rId17"/>
     <p:sldId id="267" r:id="rId18"/>
     <p:sldId id="268" r:id="rId19"/>
+    <p:sldId id="269" r:id="rId20"/>
   </p:sldIdLst>
   <p:sldSz cy="5143500" cx="9144000"/>
   <p:notesSz cx="6858000" cy="9144000"/>
@@ -816,7 +817,7 @@
       </p:grpSpPr>
       <p:sp>
         <p:nvSpPr>
-          <p:cNvPr id="110" name="Google Shape;110;g81d9777885_0_30:notes"/>
+          <p:cNvPr id="110" name="Google Shape;110;g88e59506bd_0_20:notes"/>
           <p:cNvSpPr/>
           <p:nvPr>
             <p:ph idx="2" type="sldImg"/>
@@ -851,7 +852,7 @@
       </p:sp>
       <p:sp>
         <p:nvSpPr>
-          <p:cNvPr id="111" name="Google Shape;111;g81d9777885_0_30:notes"/>
+          <p:cNvPr id="111" name="Google Shape;111;g88e59506bd_0_20:notes"/>
           <p:cNvSpPr txBox="1"/>
           <p:nvPr>
             <p:ph idx="1" type="body"/>
@@ -1014,7 +1015,7 @@
       </p:grpSpPr>
       <p:sp>
         <p:nvSpPr>
-          <p:cNvPr id="123" name="Google Shape;123;g88dfb8dd42_0_95:notes"/>
+          <p:cNvPr id="123" name="Google Shape;123;g88e59506bd_0_28:notes"/>
           <p:cNvSpPr/>
           <p:nvPr>
             <p:ph idx="2" type="sldImg"/>
@@ -1049,7 +1050,7 @@
       </p:sp>
       <p:sp>
         <p:nvSpPr>
-          <p:cNvPr id="124" name="Google Shape;124;g88dfb8dd42_0_95:notes"/>
+          <p:cNvPr id="124" name="Google Shape;124;g88e59506bd_0_28:notes"/>
           <p:cNvSpPr txBox="1"/>
           <p:nvPr>
             <p:ph idx="1" type="body"/>
@@ -1113,7 +1114,7 @@
       </p:grpSpPr>
       <p:sp>
         <p:nvSpPr>
-          <p:cNvPr id="129" name="Google Shape;129;g7a5426a61e_0_3:notes"/>
+          <p:cNvPr id="129" name="Google Shape;129;g88dfb8dd42_0_95:notes"/>
           <p:cNvSpPr/>
           <p:nvPr>
             <p:ph idx="2" type="sldImg"/>
@@ -1148,7 +1149,106 @@
       </p:sp>
       <p:sp>
         <p:nvSpPr>
-          <p:cNvPr id="130" name="Google Shape;130;g7a5426a61e_0_3:notes"/>
+          <p:cNvPr id="130" name="Google Shape;130;g88dfb8dd42_0_95:notes"/>
+          <p:cNvSpPr txBox="1"/>
+          <p:nvPr>
+            <p:ph idx="1" type="body"/>
+          </p:nvPr>
+        </p:nvSpPr>
+        <p:spPr>
+          <a:xfrm>
+            <a:off x="685800" y="4343400"/>
+            <a:ext cx="5486400" cy="4114800"/>
+          </a:xfrm>
+          <a:prstGeom prst="rect">
+            <a:avLst/>
+          </a:prstGeom>
+        </p:spPr>
+        <p:txBody>
+          <a:bodyPr anchorCtr="0" anchor="t" bIns="91425" lIns="91425" spcFirstLastPara="1" rIns="91425" wrap="square" tIns="91425">
+            <a:noAutofit/>
+          </a:bodyPr>
+          <a:lstStyle/>
+          <a:p>
+            <a:pPr indent="0" lvl="0" marL="0" rtl="0" algn="l">
+              <a:spcBef>
+                <a:spcPts val="0"/>
+              </a:spcBef>
+              <a:spcAft>
+                <a:spcPts val="0"/>
+              </a:spcAft>
+              <a:buNone/>
+            </a:pPr>
+            <a:r>
+              <a:t/>
+            </a:r>
+            <a:endParaRPr/>
+          </a:p>
+        </p:txBody>
+      </p:sp>
+    </p:spTree>
+  </p:cSld>
+  <p:clrMapOvr>
+    <a:masterClrMapping/>
+  </p:clrMapOvr>
+</p:notes>
+</file>
+
+<file path=ppt/notesSlides/notesSlide14.xml><?xml version="1.0" encoding="utf-8"?>
+<p:notes xmlns:a="http://schemas.openxmlformats.org/drawingml/2006/main" xmlns:r="http://schemas.openxmlformats.org/officeDocument/2006/relationships" xmlns:mc="http://schemas.openxmlformats.org/markup-compatibility/2006" xmlns:mv="urn:schemas-microsoft-com:mac:vml" xmlns:p="http://schemas.openxmlformats.org/presentationml/2006/main" xmlns:c="http://schemas.openxmlformats.org/drawingml/2006/chart" xmlns:dgm="http://schemas.openxmlformats.org/drawingml/2006/diagram" xmlns:o="urn:schemas-microsoft-com:office:office" xmlns:v="urn:schemas-microsoft-com:vml" xmlns:pvml="urn:schemas-microsoft-com:office:powerpoint" xmlns:com="http://schemas.openxmlformats.org/drawingml/2006/compatibility" xmlns:p14="http://schemas.microsoft.com/office/powerpoint/2010/main" xmlns:p15="http://schemas.microsoft.com/office/powerpoint/2012/main" showMasterPhAnim="0" showMasterSp="0">
+  <p:cSld>
+    <p:spTree>
+      <p:nvGrpSpPr>
+        <p:cNvPr id="134" name="Shape 134"/>
+        <p:cNvGrpSpPr/>
+        <p:nvPr/>
+      </p:nvGrpSpPr>
+      <p:grpSpPr>
+        <a:xfrm>
+          <a:off x="0" y="0"/>
+          <a:ext cx="0" cy="0"/>
+          <a:chOff x="0" y="0"/>
+          <a:chExt cx="0" cy="0"/>
+        </a:xfrm>
+      </p:grpSpPr>
+      <p:sp>
+        <p:nvSpPr>
+          <p:cNvPr id="135" name="Google Shape;135;g7a5426a61e_0_3:notes"/>
+          <p:cNvSpPr/>
+          <p:nvPr>
+            <p:ph idx="2" type="sldImg"/>
+          </p:nvPr>
+        </p:nvSpPr>
+        <p:spPr>
+          <a:xfrm>
+            <a:off x="381300" y="685800"/>
+            <a:ext cx="6096000" cy="3429000"/>
+          </a:xfrm>
+          <a:custGeom>
+            <a:rect b="b" l="l" r="r" t="t"/>
+            <a:pathLst>
+              <a:path extrusionOk="0" h="120000" w="120000">
+                <a:moveTo>
+                  <a:pt x="0" y="0"/>
+                </a:moveTo>
+                <a:lnTo>
+                  <a:pt x="120000" y="0"/>
+                </a:lnTo>
+                <a:lnTo>
+                  <a:pt x="120000" y="120000"/>
+                </a:lnTo>
+                <a:lnTo>
+                  <a:pt x="0" y="120000"/>
+                </a:lnTo>
+                <a:close/>
+              </a:path>
+            </a:pathLst>
+          </a:custGeom>
+        </p:spPr>
+      </p:sp>
+      <p:sp>
+        <p:nvSpPr>
+          <p:cNvPr id="136" name="Google Shape;136;g7a5426a61e_0_3:notes"/>
           <p:cNvSpPr txBox="1"/>
           <p:nvPr>
             <p:ph idx="1" type="body"/>
@@ -1707,7 +1807,7 @@
       </p:grpSpPr>
       <p:sp>
         <p:nvSpPr>
-          <p:cNvPr id="89" name="Google Shape;89;g89a2cb1348_0_18:notes"/>
+          <p:cNvPr id="89" name="Google Shape;89;g89a2cb1348_0_5:notes"/>
           <p:cNvSpPr/>
           <p:nvPr>
             <p:ph idx="2" type="sldImg"/>
@@ -1742,7 +1842,7 @@
       </p:sp>
       <p:sp>
         <p:nvSpPr>
-          <p:cNvPr id="90" name="Google Shape;90;g89a2cb1348_0_18:notes"/>
+          <p:cNvPr id="90" name="Google Shape;90;g89a2cb1348_0_5:notes"/>
           <p:cNvSpPr txBox="1"/>
           <p:nvPr>
             <p:ph idx="1" type="body"/>
@@ -1806,7 +1906,7 @@
       </p:grpSpPr>
       <p:sp>
         <p:nvSpPr>
-          <p:cNvPr id="96" name="Google Shape;96;g89a2cb1348_0_5:notes"/>
+          <p:cNvPr id="96" name="Google Shape;96;g88e59506bd_0_1:notes"/>
           <p:cNvSpPr/>
           <p:nvPr>
             <p:ph idx="2" type="sldImg"/>
@@ -1841,7 +1941,7 @@
       </p:sp>
       <p:sp>
         <p:nvSpPr>
-          <p:cNvPr id="97" name="Google Shape;97;g89a2cb1348_0_5:notes"/>
+          <p:cNvPr id="97" name="Google Shape;97;g88e59506bd_0_1:notes"/>
           <p:cNvSpPr txBox="1"/>
           <p:nvPr>
             <p:ph idx="1" type="body"/>
@@ -1905,7 +2005,7 @@
       </p:grpSpPr>
       <p:sp>
         <p:nvSpPr>
-          <p:cNvPr id="103" name="Google Shape;103;g81d9777885_0_18:notes"/>
+          <p:cNvPr id="103" name="Google Shape;103;g88e59506bd_0_7:notes"/>
           <p:cNvSpPr/>
           <p:nvPr>
             <p:ph idx="2" type="sldImg"/>
@@ -1940,7 +2040,7 @@
       </p:sp>
       <p:sp>
         <p:nvSpPr>
-          <p:cNvPr id="104" name="Google Shape;104;g81d9777885_0_18:notes"/>
+          <p:cNvPr id="104" name="Google Shape;104;g88e59506bd_0_7:notes"/>
           <p:cNvSpPr txBox="1"/>
           <p:nvPr>
             <p:ph idx="1" type="body"/>
@@ -6888,16 +6988,11 @@
               <a:spcAft>
                 <a:spcPts val="0"/>
               </a:spcAft>
-              <a:buClr>
-                <a:schemeClr val="dk1"/>
-              </a:buClr>
-              <a:buSzPts val="1100"/>
-              <a:buFont typeface="Arial"/>
               <a:buNone/>
             </a:pPr>
             <a:r>
               <a:rPr lang="en-GB"/>
-              <a:t>Model : ARIMAX (Symbol : MSFT)</a:t>
+              <a:t>Model : LSTM (Symbol : DAL)</a:t>
             </a:r>
             <a:endParaRPr/>
           </a:p>
@@ -6958,8 +7053,8 @@
         </p:blipFill>
         <p:spPr>
           <a:xfrm>
-            <a:off x="338625" y="1152475"/>
-            <a:ext cx="8466751" cy="3416400"/>
+            <a:off x="311701" y="1152475"/>
+            <a:ext cx="8520599" cy="3416400"/>
           </a:xfrm>
           <a:prstGeom prst="rect">
             <a:avLst/>
@@ -7050,15 +7145,18 @@
             <a:tbl>
               <a:tblPr>
                 <a:noFill/>
-                <a:tableStyleId>{BFA71022-3071-4E4C-81A9-35093D0553F4}</a:tableStyleId>
+                <a:tableStyleId>{82397FF9-EF33-4C38-A37C-778D72DD42C1}</a:tableStyleId>
               </a:tblPr>
               <a:tblGrid>
-                <a:gridCol w="1362875"/>
-                <a:gridCol w="2215525"/>
-                <a:gridCol w="2565100"/>
-                <a:gridCol w="2183025"/>
+                <a:gridCol w="914325"/>
+                <a:gridCol w="679375"/>
+                <a:gridCol w="939175"/>
+                <a:gridCol w="1855150"/>
+                <a:gridCol w="744600"/>
+                <a:gridCol w="882625"/>
+                <a:gridCol w="1134950"/>
               </a:tblGrid>
-              <a:tr h="539350">
+              <a:tr h="431225">
                 <a:tc>
                   <a:txBody>
                     <a:bodyPr/>
@@ -7121,7 +7219,7 @@
                       </a:pPr>
                       <a:r>
                         <a:rPr lang="en-GB"/>
-                        <a:t>RMSE</a:t>
+                        <a:t>No.of Records</a:t>
                       </a:r>
                       <a:endParaRPr/>
                     </a:p>
@@ -7144,15 +7242,140 @@
                       </a:pPr>
                       <a:r>
                         <a:rPr lang="en-GB"/>
-                        <a:t>MAPE</a:t>
+                        <a:t>Train-Val -Test split</a:t>
                       </a:r>
                       <a:endParaRPr/>
                     </a:p>
                   </a:txBody>
                   <a:tcPr marT="91425" marB="91425" marR="91425" marL="91425"/>
                 </a:tc>
+                <a:tc>
+                  <a:txBody>
+                    <a:bodyPr/>
+                    <a:lstStyle/>
+                    <a:p>
+                      <a:pPr indent="0" lvl="0" marL="0" rtl="0" algn="ctr">
+                        <a:spcBef>
+                          <a:spcPts val="0"/>
+                        </a:spcBef>
+                        <a:spcAft>
+                          <a:spcPts val="0"/>
+                        </a:spcAft>
+                        <a:buNone/>
+                      </a:pPr>
+                      <a:r>
+                        <a:rPr lang="en-GB"/>
+                        <a:t>Train RMSE</a:t>
+                      </a:r>
+                      <a:endParaRPr/>
+                    </a:p>
+                  </a:txBody>
+                  <a:tcPr marT="91425" marB="91425" marR="91425" marL="91425">
+                    <a:lnR cap="flat" cmpd="sng" w="9525">
+                      <a:solidFill>
+                        <a:srgbClr val="9E9E9E"/>
+                      </a:solidFill>
+                      <a:prstDash val="solid"/>
+                      <a:round/>
+                      <a:headEnd len="sm" w="sm" type="none"/>
+                      <a:tailEnd len="sm" w="sm" type="none"/>
+                    </a:lnR>
+                  </a:tcPr>
+                </a:tc>
+                <a:tc>
+                  <a:txBody>
+                    <a:bodyPr/>
+                    <a:lstStyle/>
+                    <a:p>
+                      <a:pPr indent="0" lvl="0" marL="0" rtl="0" algn="ctr">
+                        <a:spcBef>
+                          <a:spcPts val="0"/>
+                        </a:spcBef>
+                        <a:spcAft>
+                          <a:spcPts val="0"/>
+                        </a:spcAft>
+                        <a:buNone/>
+                      </a:pPr>
+                      <a:r>
+                        <a:rPr lang="en-GB"/>
+                        <a:t>Val RMSE</a:t>
+                      </a:r>
+                      <a:endParaRPr/>
+                    </a:p>
+                  </a:txBody>
+                  <a:tcPr marT="91425" marB="91425" marR="91425" marL="91425">
+                    <a:lnL cap="flat" cmpd="sng" w="9525">
+                      <a:solidFill>
+                        <a:srgbClr val="9E9E9E"/>
+                      </a:solidFill>
+                      <a:prstDash val="solid"/>
+                      <a:round/>
+                      <a:headEnd len="sm" w="sm" type="none"/>
+                      <a:tailEnd len="sm" w="sm" type="none"/>
+                    </a:lnL>
+                    <a:lnR cap="flat" cmpd="sng" w="9525">
+                      <a:solidFill>
+                        <a:srgbClr val="9E9E9E"/>
+                      </a:solidFill>
+                      <a:prstDash val="solid"/>
+                      <a:round/>
+                      <a:headEnd len="sm" w="sm" type="none"/>
+                      <a:tailEnd len="sm" w="sm" type="none"/>
+                    </a:lnR>
+                  </a:tcPr>
+                </a:tc>
+                <a:tc>
+                  <a:txBody>
+                    <a:bodyPr/>
+                    <a:lstStyle/>
+                    <a:p>
+                      <a:pPr indent="0" lvl="0" marL="0" rtl="0" algn="ctr">
+                        <a:spcBef>
+                          <a:spcPts val="0"/>
+                        </a:spcBef>
+                        <a:spcAft>
+                          <a:spcPts val="0"/>
+                        </a:spcAft>
+                        <a:buClr>
+                          <a:schemeClr val="dk1"/>
+                        </a:buClr>
+                        <a:buSzPts val="1100"/>
+                        <a:buFont typeface="Arial"/>
+                        <a:buNone/>
+                      </a:pPr>
+                      <a:r>
+                        <a:rPr lang="en-GB">
+                          <a:solidFill>
+                            <a:schemeClr val="dk1"/>
+                          </a:solidFill>
+                        </a:rPr>
+                        <a:t>Test </a:t>
+                      </a:r>
+                      <a:r>
+                        <a:rPr lang="en-GB">
+                          <a:solidFill>
+                            <a:schemeClr val="dk1"/>
+                          </a:solidFill>
+                        </a:rPr>
+                        <a:t>RMSE</a:t>
+                      </a:r>
+                      <a:endParaRPr/>
+                    </a:p>
+                  </a:txBody>
+                  <a:tcPr marT="91425" marB="91425" marR="91425" marL="91425">
+                    <a:lnL cap="flat" cmpd="sng" w="9525">
+                      <a:solidFill>
+                        <a:srgbClr val="9E9E9E"/>
+                      </a:solidFill>
+                      <a:prstDash val="solid"/>
+                      <a:round/>
+                      <a:headEnd len="sm" w="sm" type="none"/>
+                      <a:tailEnd len="sm" w="sm" type="none"/>
+                    </a:lnL>
+                  </a:tcPr>
+                </a:tc>
               </a:tr>
-              <a:tr h="539350">
+              <a:tr h="431225">
                 <a:tc>
                   <a:txBody>
                     <a:bodyPr/>
@@ -7227,90 +7450,7 @@
                             <a:schemeClr val="dk1"/>
                           </a:solidFill>
                         </a:rPr>
-                        <a:t>0.903</a:t>
-                      </a:r>
-                      <a:endParaRPr/>
-                    </a:p>
-                  </a:txBody>
-                  <a:tcPr marT="91425" marB="91425" marR="91425" marL="91425"/>
-                </a:tc>
-                <a:tc>
-                  <a:txBody>
-                    <a:bodyPr/>
-                    <a:lstStyle/>
-                    <a:p>
-                      <a:pPr indent="0" lvl="0" marL="0" rtl="0" algn="l">
-                        <a:spcBef>
-                          <a:spcPts val="0"/>
-                        </a:spcBef>
-                        <a:spcAft>
-                          <a:spcPts val="0"/>
-                        </a:spcAft>
-                        <a:buNone/>
-                      </a:pPr>
-                      <a:r>
-                        <a:rPr lang="en-GB">
-                          <a:solidFill>
-                            <a:schemeClr val="dk1"/>
-                          </a:solidFill>
-                        </a:rPr>
-                        <a:t>2.0</a:t>
-                      </a:r>
-                      <a:endParaRPr>
-                        <a:solidFill>
-                          <a:schemeClr val="dk1"/>
-                        </a:solidFill>
-                      </a:endParaRPr>
-                    </a:p>
-                  </a:txBody>
-                  <a:tcPr marT="91425" marB="91425" marR="91425" marL="91425"/>
-                </a:tc>
-              </a:tr>
-              <a:tr h="539350">
-                <a:tc>
-                  <a:txBody>
-                    <a:bodyPr/>
-                    <a:lstStyle/>
-                    <a:p>
-                      <a:pPr indent="0" lvl="0" marL="0" rtl="0" algn="l">
-                        <a:spcBef>
-                          <a:spcPts val="0"/>
-                        </a:spcBef>
-                        <a:spcAft>
-                          <a:spcPts val="0"/>
-                        </a:spcAft>
-                        <a:buNone/>
-                      </a:pPr>
-                      <a:r>
-                        <a:rPr lang="en-GB"/>
-                        <a:t>ARIMAX</a:t>
-                      </a:r>
-                      <a:endParaRPr/>
-                    </a:p>
-                  </a:txBody>
-                  <a:tcPr marT="91425" marB="91425" marR="91425" marL="91425"/>
-                </a:tc>
-                <a:tc>
-                  <a:txBody>
-                    <a:bodyPr/>
-                    <a:lstStyle/>
-                    <a:p>
-                      <a:pPr indent="0" lvl="0" marL="0" rtl="0" algn="l">
-                        <a:spcBef>
-                          <a:spcPts val="0"/>
-                        </a:spcBef>
-                        <a:spcAft>
-                          <a:spcPts val="0"/>
-                        </a:spcAft>
-                        <a:buNone/>
-                      </a:pPr>
-                      <a:r>
-                        <a:rPr lang="en-GB">
-                          <a:solidFill>
-                            <a:schemeClr val="dk1"/>
-                          </a:solidFill>
-                        </a:rPr>
-                        <a:t>AMZN</a:t>
+                        <a:t>7538</a:t>
                       </a:r>
                       <a:endParaRPr>
                         <a:solidFill>
@@ -7341,34 +7481,7 @@
                             <a:schemeClr val="dk1"/>
                           </a:solidFill>
                         </a:rPr>
-                        <a:t>16.030</a:t>
-                      </a:r>
-                      <a:endParaRPr/>
-                    </a:p>
-                  </a:txBody>
-                  <a:tcPr marT="91425" marB="91425" marR="91425" marL="91425"/>
-                </a:tc>
-                <a:tc>
-                  <a:txBody>
-                    <a:bodyPr/>
-                    <a:lstStyle/>
-                    <a:p>
-                      <a:pPr indent="0" lvl="0" marL="0" rtl="0" algn="l">
-                        <a:spcBef>
-                          <a:spcPts val="0"/>
-                        </a:spcBef>
-                        <a:spcAft>
-                          <a:spcPts val="0"/>
-                        </a:spcAft>
-                        <a:buNone/>
-                      </a:pPr>
-                      <a:r>
-                        <a:rPr lang="en-GB">
-                          <a:solidFill>
-                            <a:schemeClr val="dk1"/>
-                          </a:solidFill>
-                        </a:rPr>
-                        <a:t>0.502</a:t>
+                        <a:t>90 : 10 : 10</a:t>
                       </a:r>
                       <a:endParaRPr>
                         <a:solidFill>
@@ -7379,8 +7492,116 @@
                   </a:txBody>
                   <a:tcPr marT="91425" marB="91425" marR="91425" marL="91425"/>
                 </a:tc>
+                <a:tc>
+                  <a:txBody>
+                    <a:bodyPr/>
+                    <a:lstStyle/>
+                    <a:p>
+                      <a:pPr indent="0" lvl="0" marL="0" rtl="0" algn="ctr">
+                        <a:spcBef>
+                          <a:spcPts val="0"/>
+                        </a:spcBef>
+                        <a:spcAft>
+                          <a:spcPts val="0"/>
+                        </a:spcAft>
+                        <a:buNone/>
+                      </a:pPr>
+                      <a:r>
+                        <a:rPr lang="en-GB"/>
+                        <a:t>-------</a:t>
+                      </a:r>
+                      <a:endParaRPr/>
+                    </a:p>
+                  </a:txBody>
+                  <a:tcPr marT="91425" marB="91425" marR="91425" marL="91425">
+                    <a:lnR cap="flat" cmpd="sng" w="9525">
+                      <a:solidFill>
+                        <a:srgbClr val="9E9E9E"/>
+                      </a:solidFill>
+                      <a:prstDash val="solid"/>
+                      <a:round/>
+                      <a:headEnd len="sm" w="sm" type="none"/>
+                      <a:tailEnd len="sm" w="sm" type="none"/>
+                    </a:lnR>
+                  </a:tcPr>
+                </a:tc>
+                <a:tc>
+                  <a:txBody>
+                    <a:bodyPr/>
+                    <a:lstStyle/>
+                    <a:p>
+                      <a:pPr indent="0" lvl="0" marL="0" rtl="0" algn="ctr">
+                        <a:spcBef>
+                          <a:spcPts val="0"/>
+                        </a:spcBef>
+                        <a:spcAft>
+                          <a:spcPts val="0"/>
+                        </a:spcAft>
+                        <a:buNone/>
+                      </a:pPr>
+                      <a:r>
+                        <a:rPr lang="en-GB"/>
+                        <a:t>3.99</a:t>
+                      </a:r>
+                      <a:endParaRPr/>
+                    </a:p>
+                  </a:txBody>
+                  <a:tcPr marT="91425" marB="91425" marR="91425" marL="91425">
+                    <a:lnL cap="flat" cmpd="sng" w="9525">
+                      <a:solidFill>
+                        <a:srgbClr val="9E9E9E"/>
+                      </a:solidFill>
+                      <a:prstDash val="solid"/>
+                      <a:round/>
+                      <a:headEnd len="sm" w="sm" type="none"/>
+                      <a:tailEnd len="sm" w="sm" type="none"/>
+                    </a:lnL>
+                    <a:lnR cap="flat" cmpd="sng" w="9525">
+                      <a:solidFill>
+                        <a:srgbClr val="9E9E9E"/>
+                      </a:solidFill>
+                      <a:prstDash val="solid"/>
+                      <a:round/>
+                      <a:headEnd len="sm" w="sm" type="none"/>
+                      <a:tailEnd len="sm" w="sm" type="none"/>
+                    </a:lnR>
+                  </a:tcPr>
+                </a:tc>
+                <a:tc>
+                  <a:txBody>
+                    <a:bodyPr/>
+                    <a:lstStyle/>
+                    <a:p>
+                      <a:pPr indent="0" lvl="0" marL="0" rtl="0" algn="ctr">
+                        <a:spcBef>
+                          <a:spcPts val="0"/>
+                        </a:spcBef>
+                        <a:spcAft>
+                          <a:spcPts val="0"/>
+                        </a:spcAft>
+                        <a:buNone/>
+                      </a:pPr>
+                      <a:r>
+                        <a:rPr lang="en-GB"/>
+                        <a:t>0.97</a:t>
+                      </a:r>
+                      <a:endParaRPr/>
+                    </a:p>
+                  </a:txBody>
+                  <a:tcPr marT="91425" marB="91425" marR="91425" marL="91425">
+                    <a:lnL cap="flat" cmpd="sng" w="9525">
+                      <a:solidFill>
+                        <a:srgbClr val="9E9E9E"/>
+                      </a:solidFill>
+                      <a:prstDash val="solid"/>
+                      <a:round/>
+                      <a:headEnd len="sm" w="sm" type="none"/>
+                      <a:tailEnd len="sm" w="sm" type="none"/>
+                    </a:lnL>
+                  </a:tcPr>
+                </a:tc>
               </a:tr>
-              <a:tr h="539350">
+              <a:tr h="431225">
                 <a:tc>
                   <a:txBody>
                     <a:bodyPr/>
@@ -7455,7 +7676,212 @@
                             <a:schemeClr val="dk1"/>
                           </a:solidFill>
                         </a:rPr>
-                        <a:t>1.406</a:t>
+                        <a:t>6139</a:t>
+                      </a:r>
+                      <a:endParaRPr>
+                        <a:solidFill>
+                          <a:schemeClr val="dk1"/>
+                        </a:solidFill>
+                      </a:endParaRPr>
+                    </a:p>
+                  </a:txBody>
+                  <a:tcPr marT="91425" marB="91425" marR="91425" marL="91425"/>
+                </a:tc>
+                <a:tc>
+                  <a:txBody>
+                    <a:bodyPr/>
+                    <a:lstStyle/>
+                    <a:p>
+                      <a:pPr indent="0" lvl="0" marL="0" rtl="0" algn="l">
+                        <a:spcBef>
+                          <a:spcPts val="0"/>
+                        </a:spcBef>
+                        <a:spcAft>
+                          <a:spcPts val="0"/>
+                        </a:spcAft>
+                        <a:buClr>
+                          <a:schemeClr val="dk1"/>
+                        </a:buClr>
+                        <a:buSzPts val="1100"/>
+                        <a:buFont typeface="Arial"/>
+                        <a:buNone/>
+                      </a:pPr>
+                      <a:r>
+                        <a:rPr lang="en-GB">
+                          <a:solidFill>
+                            <a:schemeClr val="dk1"/>
+                          </a:solidFill>
+                        </a:rPr>
+                        <a:t>90 : 10 : 10</a:t>
+                      </a:r>
+                      <a:endParaRPr>
+                        <a:solidFill>
+                          <a:schemeClr val="dk1"/>
+                        </a:solidFill>
+                      </a:endParaRPr>
+                    </a:p>
+                  </a:txBody>
+                  <a:tcPr marT="91425" marB="91425" marR="91425" marL="91425"/>
+                </a:tc>
+                <a:tc>
+                  <a:txBody>
+                    <a:bodyPr/>
+                    <a:lstStyle/>
+                    <a:p>
+                      <a:pPr indent="0" lvl="0" marL="0" rtl="0" algn="ctr">
+                        <a:spcBef>
+                          <a:spcPts val="0"/>
+                        </a:spcBef>
+                        <a:spcAft>
+                          <a:spcPts val="0"/>
+                        </a:spcAft>
+                        <a:buNone/>
+                      </a:pPr>
+                      <a:r>
+                        <a:rPr lang="en-GB"/>
+                        <a:t>-------</a:t>
+                      </a:r>
+                      <a:endParaRPr/>
+                    </a:p>
+                  </a:txBody>
+                  <a:tcPr marT="91425" marB="91425" marR="91425" marL="91425">
+                    <a:lnR cap="flat" cmpd="sng" w="9525">
+                      <a:solidFill>
+                        <a:srgbClr val="9E9E9E"/>
+                      </a:solidFill>
+                      <a:prstDash val="solid"/>
+                      <a:round/>
+                      <a:headEnd len="sm" w="sm" type="none"/>
+                      <a:tailEnd len="sm" w="sm" type="none"/>
+                    </a:lnR>
+                  </a:tcPr>
+                </a:tc>
+                <a:tc>
+                  <a:txBody>
+                    <a:bodyPr/>
+                    <a:lstStyle/>
+                    <a:p>
+                      <a:pPr indent="0" lvl="0" marL="0" rtl="0" algn="ctr">
+                        <a:spcBef>
+                          <a:spcPts val="0"/>
+                        </a:spcBef>
+                        <a:spcAft>
+                          <a:spcPts val="0"/>
+                        </a:spcAft>
+                        <a:buNone/>
+                      </a:pPr>
+                      <a:r>
+                        <a:rPr lang="en-GB"/>
+                        <a:t>3.50</a:t>
+                      </a:r>
+                      <a:endParaRPr/>
+                    </a:p>
+                  </a:txBody>
+                  <a:tcPr marT="91425" marB="91425" marR="91425" marL="91425">
+                    <a:lnL cap="flat" cmpd="sng" w="9525">
+                      <a:solidFill>
+                        <a:srgbClr val="9E9E9E"/>
+                      </a:solidFill>
+                      <a:prstDash val="solid"/>
+                      <a:round/>
+                      <a:headEnd len="sm" w="sm" type="none"/>
+                      <a:tailEnd len="sm" w="sm" type="none"/>
+                    </a:lnL>
+                    <a:lnR cap="flat" cmpd="sng" w="9525">
+                      <a:solidFill>
+                        <a:srgbClr val="9E9E9E"/>
+                      </a:solidFill>
+                      <a:prstDash val="solid"/>
+                      <a:round/>
+                      <a:headEnd len="sm" w="sm" type="none"/>
+                      <a:tailEnd len="sm" w="sm" type="none"/>
+                    </a:lnR>
+                  </a:tcPr>
+                </a:tc>
+                <a:tc>
+                  <a:txBody>
+                    <a:bodyPr/>
+                    <a:lstStyle/>
+                    <a:p>
+                      <a:pPr indent="0" lvl="0" marL="0" rtl="0" algn="ctr">
+                        <a:spcBef>
+                          <a:spcPts val="0"/>
+                        </a:spcBef>
+                        <a:spcAft>
+                          <a:spcPts val="0"/>
+                        </a:spcAft>
+                        <a:buNone/>
+                      </a:pPr>
+                      <a:r>
+                        <a:rPr lang="en-GB"/>
+                        <a:t>1.88</a:t>
+                      </a:r>
+                      <a:endParaRPr/>
+                    </a:p>
+                  </a:txBody>
+                  <a:tcPr marT="91425" marB="91425" marR="91425" marL="91425">
+                    <a:lnL cap="flat" cmpd="sng" w="9525">
+                      <a:solidFill>
+                        <a:srgbClr val="9E9E9E"/>
+                      </a:solidFill>
+                      <a:prstDash val="solid"/>
+                      <a:round/>
+                      <a:headEnd len="sm" w="sm" type="none"/>
+                      <a:tailEnd len="sm" w="sm" type="none"/>
+                    </a:lnL>
+                  </a:tcPr>
+                </a:tc>
+              </a:tr>
+              <a:tr h="431225">
+                <a:tc>
+                  <a:txBody>
+                    <a:bodyPr/>
+                    <a:lstStyle/>
+                    <a:p>
+                      <a:pPr indent="0" lvl="0" marL="0" rtl="0" algn="l">
+                        <a:spcBef>
+                          <a:spcPts val="0"/>
+                        </a:spcBef>
+                        <a:spcAft>
+                          <a:spcPts val="0"/>
+                        </a:spcAft>
+                        <a:buNone/>
+                      </a:pPr>
+                      <a:r>
+                        <a:rPr lang="en-GB"/>
+                        <a:t>ARIMAX</a:t>
+                      </a:r>
+                      <a:endParaRPr/>
+                    </a:p>
+                  </a:txBody>
+                  <a:tcPr marT="91425" marB="91425" marR="91425" marL="91425"/>
+                </a:tc>
+                <a:tc>
+                  <a:txBody>
+                    <a:bodyPr/>
+                    <a:lstStyle/>
+                    <a:p>
+                      <a:pPr indent="0" lvl="0" marL="0" rtl="0" algn="l">
+                        <a:spcBef>
+                          <a:spcPts val="0"/>
+                        </a:spcBef>
+                        <a:spcAft>
+                          <a:spcPts val="0"/>
+                        </a:spcAft>
+                        <a:buClr>
+                          <a:schemeClr val="dk1"/>
+                        </a:buClr>
+                        <a:buSzPts val="1100"/>
+                        <a:buFont typeface="Arial"/>
+                        <a:buNone/>
+                      </a:pPr>
+                      <a:r>
+                        <a:rPr lang="en-GB">
+                          <a:solidFill>
+                            <a:schemeClr val="dk1"/>
+                          </a:solidFill>
+                        </a:rPr>
+                        <a:t>A</a:t>
                       </a:r>
                       <a:endParaRPr>
                         <a:solidFill>
@@ -7486,7 +7912,1052 @@
                             <a:schemeClr val="dk1"/>
                           </a:solidFill>
                         </a:rPr>
-                        <a:t>0.552</a:t>
+                        <a:t>3264</a:t>
+                      </a:r>
+                      <a:endParaRPr>
+                        <a:solidFill>
+                          <a:schemeClr val="dk1"/>
+                        </a:solidFill>
+                      </a:endParaRPr>
+                    </a:p>
+                  </a:txBody>
+                  <a:tcPr marT="91425" marB="91425" marR="91425" marL="91425">
+                    <a:lnB cap="flat" cmpd="sng" w="9525">
+                      <a:solidFill>
+                        <a:srgbClr val="9E9E9E"/>
+                      </a:solidFill>
+                      <a:prstDash val="solid"/>
+                      <a:round/>
+                      <a:headEnd len="sm" w="sm" type="none"/>
+                      <a:tailEnd len="sm" w="sm" type="none"/>
+                    </a:lnB>
+                  </a:tcPr>
+                </a:tc>
+                <a:tc>
+                  <a:txBody>
+                    <a:bodyPr/>
+                    <a:lstStyle/>
+                    <a:p>
+                      <a:pPr indent="0" lvl="0" marL="0" rtl="0" algn="l">
+                        <a:spcBef>
+                          <a:spcPts val="0"/>
+                        </a:spcBef>
+                        <a:spcAft>
+                          <a:spcPts val="0"/>
+                        </a:spcAft>
+                        <a:buClr>
+                          <a:schemeClr val="dk1"/>
+                        </a:buClr>
+                        <a:buSzPts val="1100"/>
+                        <a:buFont typeface="Arial"/>
+                        <a:buNone/>
+                      </a:pPr>
+                      <a:r>
+                        <a:rPr lang="en-GB">
+                          <a:solidFill>
+                            <a:schemeClr val="dk1"/>
+                          </a:solidFill>
+                        </a:rPr>
+                        <a:t>90 : 10 : 10</a:t>
+                      </a:r>
+                      <a:endParaRPr>
+                        <a:solidFill>
+                          <a:schemeClr val="dk1"/>
+                        </a:solidFill>
+                      </a:endParaRPr>
+                    </a:p>
+                  </a:txBody>
+                  <a:tcPr marT="91425" marB="91425" marR="91425" marL="91425"/>
+                </a:tc>
+                <a:tc>
+                  <a:txBody>
+                    <a:bodyPr/>
+                    <a:lstStyle/>
+                    <a:p>
+                      <a:pPr indent="0" lvl="0" marL="0" rtl="0" algn="ctr">
+                        <a:spcBef>
+                          <a:spcPts val="0"/>
+                        </a:spcBef>
+                        <a:spcAft>
+                          <a:spcPts val="0"/>
+                        </a:spcAft>
+                        <a:buNone/>
+                      </a:pPr>
+                      <a:r>
+                        <a:rPr lang="en-GB"/>
+                        <a:t>-------</a:t>
+                      </a:r>
+                      <a:endParaRPr/>
+                    </a:p>
+                  </a:txBody>
+                  <a:tcPr marT="91425" marB="91425" marR="91425" marL="91425">
+                    <a:lnR cap="flat" cmpd="sng" w="9525">
+                      <a:solidFill>
+                        <a:srgbClr val="9E9E9E"/>
+                      </a:solidFill>
+                      <a:prstDash val="solid"/>
+                      <a:round/>
+                      <a:headEnd len="sm" w="sm" type="none"/>
+                      <a:tailEnd len="sm" w="sm" type="none"/>
+                    </a:lnR>
+                  </a:tcPr>
+                </a:tc>
+                <a:tc>
+                  <a:txBody>
+                    <a:bodyPr/>
+                    <a:lstStyle/>
+                    <a:p>
+                      <a:pPr indent="0" lvl="0" marL="0" rtl="0" algn="ctr">
+                        <a:spcBef>
+                          <a:spcPts val="0"/>
+                        </a:spcBef>
+                        <a:spcAft>
+                          <a:spcPts val="0"/>
+                        </a:spcAft>
+                        <a:buNone/>
+                      </a:pPr>
+                      <a:r>
+                        <a:rPr lang="en-GB"/>
+                        <a:t>1.08</a:t>
+                      </a:r>
+                      <a:endParaRPr/>
+                    </a:p>
+                  </a:txBody>
+                  <a:tcPr marT="91425" marB="91425" marR="91425" marL="91425">
+                    <a:lnL cap="flat" cmpd="sng" w="9525">
+                      <a:solidFill>
+                        <a:srgbClr val="9E9E9E"/>
+                      </a:solidFill>
+                      <a:prstDash val="solid"/>
+                      <a:round/>
+                      <a:headEnd len="sm" w="sm" type="none"/>
+                      <a:tailEnd len="sm" w="sm" type="none"/>
+                    </a:lnL>
+                    <a:lnR cap="flat" cmpd="sng" w="9525">
+                      <a:solidFill>
+                        <a:srgbClr val="9E9E9E"/>
+                      </a:solidFill>
+                      <a:prstDash val="solid"/>
+                      <a:round/>
+                      <a:headEnd len="sm" w="sm" type="none"/>
+                      <a:tailEnd len="sm" w="sm" type="none"/>
+                    </a:lnR>
+                  </a:tcPr>
+                </a:tc>
+                <a:tc>
+                  <a:txBody>
+                    <a:bodyPr/>
+                    <a:lstStyle/>
+                    <a:p>
+                      <a:pPr indent="0" lvl="0" marL="0" rtl="0" algn="ctr">
+                        <a:spcBef>
+                          <a:spcPts val="0"/>
+                        </a:spcBef>
+                        <a:spcAft>
+                          <a:spcPts val="0"/>
+                        </a:spcAft>
+                        <a:buNone/>
+                      </a:pPr>
+                      <a:r>
+                        <a:rPr lang="en-GB"/>
+                        <a:t>0.754</a:t>
+                      </a:r>
+                      <a:endParaRPr/>
+                    </a:p>
+                  </a:txBody>
+                  <a:tcPr marT="91425" marB="91425" marR="91425" marL="91425">
+                    <a:lnL cap="flat" cmpd="sng" w="9525">
+                      <a:solidFill>
+                        <a:srgbClr val="9E9E9E"/>
+                      </a:solidFill>
+                      <a:prstDash val="solid"/>
+                      <a:round/>
+                      <a:headEnd len="sm" w="sm" type="none"/>
+                      <a:tailEnd len="sm" w="sm" type="none"/>
+                    </a:lnL>
+                  </a:tcPr>
+                </a:tc>
+              </a:tr>
+              <a:tr h="431225">
+                <a:tc>
+                  <a:txBody>
+                    <a:bodyPr/>
+                    <a:lstStyle/>
+                    <a:p>
+                      <a:pPr indent="0" lvl="0" marL="0" rtl="0" algn="l">
+                        <a:spcBef>
+                          <a:spcPts val="0"/>
+                        </a:spcBef>
+                        <a:spcAft>
+                          <a:spcPts val="0"/>
+                        </a:spcAft>
+                        <a:buNone/>
+                      </a:pPr>
+                      <a:r>
+                        <a:rPr lang="en-GB"/>
+                        <a:t>LSTM</a:t>
+                      </a:r>
+                      <a:endParaRPr/>
+                    </a:p>
+                  </a:txBody>
+                  <a:tcPr marT="91425" marB="91425" marR="91425" marL="91425"/>
+                </a:tc>
+                <a:tc>
+                  <a:txBody>
+                    <a:bodyPr/>
+                    <a:lstStyle/>
+                    <a:p>
+                      <a:pPr indent="0" lvl="0" marL="0" rtl="0" algn="l">
+                        <a:spcBef>
+                          <a:spcPts val="0"/>
+                        </a:spcBef>
+                        <a:spcAft>
+                          <a:spcPts val="0"/>
+                        </a:spcAft>
+                        <a:buClr>
+                          <a:schemeClr val="dk1"/>
+                        </a:buClr>
+                        <a:buSzPts val="1100"/>
+                        <a:buFont typeface="Arial"/>
+                        <a:buNone/>
+                      </a:pPr>
+                      <a:r>
+                        <a:rPr lang="en-GB">
+                          <a:solidFill>
+                            <a:schemeClr val="dk1"/>
+                          </a:solidFill>
+                        </a:rPr>
+                        <a:t>DAL</a:t>
+                      </a:r>
+                      <a:endParaRPr>
+                        <a:solidFill>
+                          <a:schemeClr val="dk1"/>
+                        </a:solidFill>
+                      </a:endParaRPr>
+                    </a:p>
+                  </a:txBody>
+                  <a:tcPr marT="91425" marB="91425" marR="91425" marL="91425">
+                    <a:lnR cap="flat" cmpd="sng" w="9525">
+                      <a:solidFill>
+                        <a:srgbClr val="9E9E9E"/>
+                      </a:solidFill>
+                      <a:prstDash val="solid"/>
+                      <a:round/>
+                      <a:headEnd len="sm" w="sm" type="none"/>
+                      <a:tailEnd len="sm" w="sm" type="none"/>
+                    </a:lnR>
+                  </a:tcPr>
+                </a:tc>
+                <a:tc>
+                  <a:txBody>
+                    <a:bodyPr/>
+                    <a:lstStyle/>
+                    <a:p>
+                      <a:pPr indent="0" lvl="0" marL="0" rtl="0" algn="l">
+                        <a:spcBef>
+                          <a:spcPts val="0"/>
+                        </a:spcBef>
+                        <a:spcAft>
+                          <a:spcPts val="0"/>
+                        </a:spcAft>
+                        <a:buNone/>
+                      </a:pPr>
+                      <a:r>
+                        <a:rPr lang="en-GB">
+                          <a:solidFill>
+                            <a:schemeClr val="dk1"/>
+                          </a:solidFill>
+                        </a:rPr>
+                        <a:t>7538</a:t>
+                      </a:r>
+                      <a:endParaRPr>
+                        <a:solidFill>
+                          <a:schemeClr val="dk1"/>
+                        </a:solidFill>
+                      </a:endParaRPr>
+                    </a:p>
+                  </a:txBody>
+                  <a:tcPr marT="91425" marB="91425" marR="91425" marL="91425">
+                    <a:lnL cap="flat" cmpd="sng" w="9525">
+                      <a:solidFill>
+                        <a:srgbClr val="9E9E9E"/>
+                      </a:solidFill>
+                      <a:prstDash val="solid"/>
+                      <a:round/>
+                      <a:headEnd len="sm" w="sm" type="none"/>
+                      <a:tailEnd len="sm" w="sm" type="none"/>
+                    </a:lnL>
+                    <a:lnR cap="flat" cmpd="sng" w="9525">
+                      <a:solidFill>
+                        <a:srgbClr val="9E9E9E"/>
+                      </a:solidFill>
+                      <a:prstDash val="solid"/>
+                      <a:round/>
+                      <a:headEnd len="sm" w="sm" type="none"/>
+                      <a:tailEnd len="sm" w="sm" type="none"/>
+                    </a:lnR>
+                    <a:lnT cap="flat" cmpd="sng" w="9525">
+                      <a:solidFill>
+                        <a:srgbClr val="9E9E9E"/>
+                      </a:solidFill>
+                      <a:prstDash val="solid"/>
+                      <a:round/>
+                      <a:headEnd len="sm" w="sm" type="none"/>
+                      <a:tailEnd len="sm" w="sm" type="none"/>
+                    </a:lnT>
+                    <a:lnB cap="flat" cmpd="sng" w="9525">
+                      <a:solidFill>
+                        <a:srgbClr val="9E9E9E"/>
+                      </a:solidFill>
+                      <a:prstDash val="solid"/>
+                      <a:round/>
+                      <a:headEnd len="sm" w="sm" type="none"/>
+                      <a:tailEnd len="sm" w="sm" type="none"/>
+                    </a:lnB>
+                  </a:tcPr>
+                </a:tc>
+                <a:tc>
+                  <a:txBody>
+                    <a:bodyPr/>
+                    <a:lstStyle/>
+                    <a:p>
+                      <a:pPr indent="0" lvl="0" marL="0" rtl="0" algn="l">
+                        <a:spcBef>
+                          <a:spcPts val="0"/>
+                        </a:spcBef>
+                        <a:spcAft>
+                          <a:spcPts val="0"/>
+                        </a:spcAft>
+                        <a:buClr>
+                          <a:schemeClr val="dk1"/>
+                        </a:buClr>
+                        <a:buSzPts val="1100"/>
+                        <a:buFont typeface="Arial"/>
+                        <a:buNone/>
+                      </a:pPr>
+                      <a:r>
+                        <a:rPr lang="en-GB">
+                          <a:solidFill>
+                            <a:schemeClr val="dk1"/>
+                          </a:solidFill>
+                        </a:rPr>
+                        <a:t>90 : 10</a:t>
+                      </a:r>
+                      <a:endParaRPr>
+                        <a:solidFill>
+                          <a:schemeClr val="dk1"/>
+                        </a:solidFill>
+                      </a:endParaRPr>
+                    </a:p>
+                  </a:txBody>
+                  <a:tcPr marT="91425" marB="91425" marR="91425" marL="91425">
+                    <a:lnL cap="flat" cmpd="sng" w="9525">
+                      <a:solidFill>
+                        <a:srgbClr val="9E9E9E"/>
+                      </a:solidFill>
+                      <a:prstDash val="solid"/>
+                      <a:round/>
+                      <a:headEnd len="sm" w="sm" type="none"/>
+                      <a:tailEnd len="sm" w="sm" type="none"/>
+                    </a:lnL>
+                  </a:tcPr>
+                </a:tc>
+                <a:tc>
+                  <a:txBody>
+                    <a:bodyPr/>
+                    <a:lstStyle/>
+                    <a:p>
+                      <a:pPr indent="0" lvl="0" marL="0" rtl="0" algn="ctr">
+                        <a:spcBef>
+                          <a:spcPts val="0"/>
+                        </a:spcBef>
+                        <a:spcAft>
+                          <a:spcPts val="0"/>
+                        </a:spcAft>
+                        <a:buNone/>
+                      </a:pPr>
+                      <a:r>
+                        <a:rPr lang="en-GB">
+                          <a:solidFill>
+                            <a:schemeClr val="dk1"/>
+                          </a:solidFill>
+                        </a:rPr>
+                        <a:t>0.405</a:t>
+                      </a:r>
+                      <a:endParaRPr>
+                        <a:solidFill>
+                          <a:schemeClr val="dk1"/>
+                        </a:solidFill>
+                      </a:endParaRPr>
+                    </a:p>
+                  </a:txBody>
+                  <a:tcPr marT="91425" marB="91425" marR="91425" marL="91425">
+                    <a:lnR cap="flat" cmpd="sng" w="9525">
+                      <a:solidFill>
+                        <a:srgbClr val="9E9E9E"/>
+                      </a:solidFill>
+                      <a:prstDash val="solid"/>
+                      <a:round/>
+                      <a:headEnd len="sm" w="sm" type="none"/>
+                      <a:tailEnd len="sm" w="sm" type="none"/>
+                    </a:lnR>
+                  </a:tcPr>
+                </a:tc>
+                <a:tc>
+                  <a:txBody>
+                    <a:bodyPr/>
+                    <a:lstStyle/>
+                    <a:p>
+                      <a:pPr indent="0" lvl="0" marL="0" rtl="0" algn="ctr">
+                        <a:spcBef>
+                          <a:spcPts val="0"/>
+                        </a:spcBef>
+                        <a:spcAft>
+                          <a:spcPts val="0"/>
+                        </a:spcAft>
+                        <a:buNone/>
+                      </a:pPr>
+                      <a:r>
+                        <a:rPr lang="en-GB">
+                          <a:solidFill>
+                            <a:schemeClr val="dk1"/>
+                          </a:solidFill>
+                        </a:rPr>
+                        <a:t>------</a:t>
+                      </a:r>
+                      <a:endParaRPr>
+                        <a:solidFill>
+                          <a:schemeClr val="dk1"/>
+                        </a:solidFill>
+                      </a:endParaRPr>
+                    </a:p>
+                  </a:txBody>
+                  <a:tcPr marT="91425" marB="91425" marR="91425" marL="91425">
+                    <a:lnL cap="flat" cmpd="sng" w="9525">
+                      <a:solidFill>
+                        <a:srgbClr val="9E9E9E"/>
+                      </a:solidFill>
+                      <a:prstDash val="solid"/>
+                      <a:round/>
+                      <a:headEnd len="sm" w="sm" type="none"/>
+                      <a:tailEnd len="sm" w="sm" type="none"/>
+                    </a:lnL>
+                    <a:lnR cap="flat" cmpd="sng" w="9525">
+                      <a:solidFill>
+                        <a:srgbClr val="9E9E9E"/>
+                      </a:solidFill>
+                      <a:prstDash val="solid"/>
+                      <a:round/>
+                      <a:headEnd len="sm" w="sm" type="none"/>
+                      <a:tailEnd len="sm" w="sm" type="none"/>
+                    </a:lnR>
+                  </a:tcPr>
+                </a:tc>
+                <a:tc>
+                  <a:txBody>
+                    <a:bodyPr/>
+                    <a:lstStyle/>
+                    <a:p>
+                      <a:pPr indent="0" lvl="0" marL="0" rtl="0" algn="ctr">
+                        <a:spcBef>
+                          <a:spcPts val="0"/>
+                        </a:spcBef>
+                        <a:spcAft>
+                          <a:spcPts val="0"/>
+                        </a:spcAft>
+                        <a:buNone/>
+                      </a:pPr>
+                      <a:r>
+                        <a:rPr lang="en-GB">
+                          <a:solidFill>
+                            <a:schemeClr val="dk1"/>
+                          </a:solidFill>
+                        </a:rPr>
+                        <a:t>7.112</a:t>
+                      </a:r>
+                      <a:endParaRPr>
+                        <a:solidFill>
+                          <a:schemeClr val="dk1"/>
+                        </a:solidFill>
+                      </a:endParaRPr>
+                    </a:p>
+                  </a:txBody>
+                  <a:tcPr marT="91425" marB="91425" marR="91425" marL="91425">
+                    <a:lnL cap="flat" cmpd="sng" w="9525">
+                      <a:solidFill>
+                        <a:srgbClr val="9E9E9E"/>
+                      </a:solidFill>
+                      <a:prstDash val="solid"/>
+                      <a:round/>
+                      <a:headEnd len="sm" w="sm" type="none"/>
+                      <a:tailEnd len="sm" w="sm" type="none"/>
+                    </a:lnL>
+                  </a:tcPr>
+                </a:tc>
+              </a:tr>
+              <a:tr h="431225">
+                <a:tc>
+                  <a:txBody>
+                    <a:bodyPr/>
+                    <a:lstStyle/>
+                    <a:p>
+                      <a:pPr indent="0" lvl="0" marL="0" rtl="0" algn="l">
+                        <a:spcBef>
+                          <a:spcPts val="0"/>
+                        </a:spcBef>
+                        <a:spcAft>
+                          <a:spcPts val="0"/>
+                        </a:spcAft>
+                        <a:buClr>
+                          <a:schemeClr val="dk1"/>
+                        </a:buClr>
+                        <a:buSzPts val="1100"/>
+                        <a:buFont typeface="Arial"/>
+                        <a:buNone/>
+                      </a:pPr>
+                      <a:r>
+                        <a:rPr lang="en-GB">
+                          <a:solidFill>
+                            <a:schemeClr val="dk1"/>
+                          </a:solidFill>
+                        </a:rPr>
+                        <a:t>LSTM</a:t>
+                      </a:r>
+                      <a:endParaRPr/>
+                    </a:p>
+                  </a:txBody>
+                  <a:tcPr marT="91425" marB="91425" marR="91425" marL="91425"/>
+                </a:tc>
+                <a:tc>
+                  <a:txBody>
+                    <a:bodyPr/>
+                    <a:lstStyle/>
+                    <a:p>
+                      <a:pPr indent="0" lvl="0" marL="0" rtl="0" algn="l">
+                        <a:spcBef>
+                          <a:spcPts val="0"/>
+                        </a:spcBef>
+                        <a:spcAft>
+                          <a:spcPts val="0"/>
+                        </a:spcAft>
+                        <a:buClr>
+                          <a:schemeClr val="dk1"/>
+                        </a:buClr>
+                        <a:buSzPts val="1100"/>
+                        <a:buFont typeface="Arial"/>
+                        <a:buNone/>
+                      </a:pPr>
+                      <a:r>
+                        <a:rPr lang="en-GB">
+                          <a:solidFill>
+                            <a:schemeClr val="dk1"/>
+                          </a:solidFill>
+                        </a:rPr>
+                        <a:t>MSFT</a:t>
+                      </a:r>
+                      <a:endParaRPr>
+                        <a:solidFill>
+                          <a:schemeClr val="dk1"/>
+                        </a:solidFill>
+                      </a:endParaRPr>
+                    </a:p>
+                  </a:txBody>
+                  <a:tcPr marT="91425" marB="91425" marR="91425" marL="91425">
+                    <a:lnR cap="flat" cmpd="sng" w="9525">
+                      <a:solidFill>
+                        <a:srgbClr val="9E9E9E"/>
+                      </a:solidFill>
+                      <a:prstDash val="solid"/>
+                      <a:round/>
+                      <a:headEnd len="sm" w="sm" type="none"/>
+                      <a:tailEnd len="sm" w="sm" type="none"/>
+                    </a:lnR>
+                  </a:tcPr>
+                </a:tc>
+                <a:tc>
+                  <a:txBody>
+                    <a:bodyPr/>
+                    <a:lstStyle/>
+                    <a:p>
+                      <a:pPr indent="0" lvl="0" marL="0" rtl="0" algn="l">
+                        <a:spcBef>
+                          <a:spcPts val="0"/>
+                        </a:spcBef>
+                        <a:spcAft>
+                          <a:spcPts val="0"/>
+                        </a:spcAft>
+                        <a:buNone/>
+                      </a:pPr>
+                      <a:r>
+                        <a:rPr lang="en-GB">
+                          <a:solidFill>
+                            <a:schemeClr val="dk1"/>
+                          </a:solidFill>
+                        </a:rPr>
+                        <a:t>6139</a:t>
+                      </a:r>
+                      <a:endParaRPr>
+                        <a:solidFill>
+                          <a:schemeClr val="dk1"/>
+                        </a:solidFill>
+                      </a:endParaRPr>
+                    </a:p>
+                  </a:txBody>
+                  <a:tcPr marT="91425" marB="91425" marR="91425" marL="91425">
+                    <a:lnL cap="flat" cmpd="sng" w="9525">
+                      <a:solidFill>
+                        <a:srgbClr val="9E9E9E"/>
+                      </a:solidFill>
+                      <a:prstDash val="solid"/>
+                      <a:round/>
+                      <a:headEnd len="sm" w="sm" type="none"/>
+                      <a:tailEnd len="sm" w="sm" type="none"/>
+                    </a:lnL>
+                    <a:lnR cap="flat" cmpd="sng" w="9525">
+                      <a:solidFill>
+                        <a:srgbClr val="9E9E9E"/>
+                      </a:solidFill>
+                      <a:prstDash val="solid"/>
+                      <a:round/>
+                      <a:headEnd len="sm" w="sm" type="none"/>
+                      <a:tailEnd len="sm" w="sm" type="none"/>
+                    </a:lnR>
+                    <a:lnT cap="flat" cmpd="sng" w="9525">
+                      <a:solidFill>
+                        <a:srgbClr val="9E9E9E"/>
+                      </a:solidFill>
+                      <a:prstDash val="solid"/>
+                      <a:round/>
+                      <a:headEnd len="sm" w="sm" type="none"/>
+                      <a:tailEnd len="sm" w="sm" type="none"/>
+                    </a:lnT>
+                    <a:lnB cap="flat" cmpd="sng" w="9525">
+                      <a:solidFill>
+                        <a:srgbClr val="9E9E9E"/>
+                      </a:solidFill>
+                      <a:prstDash val="solid"/>
+                      <a:round/>
+                      <a:headEnd len="sm" w="sm" type="none"/>
+                      <a:tailEnd len="sm" w="sm" type="none"/>
+                    </a:lnB>
+                  </a:tcPr>
+                </a:tc>
+                <a:tc>
+                  <a:txBody>
+                    <a:bodyPr/>
+                    <a:lstStyle/>
+                    <a:p>
+                      <a:pPr indent="0" lvl="0" marL="0" rtl="0" algn="l">
+                        <a:spcBef>
+                          <a:spcPts val="0"/>
+                        </a:spcBef>
+                        <a:spcAft>
+                          <a:spcPts val="0"/>
+                        </a:spcAft>
+                        <a:buClr>
+                          <a:schemeClr val="dk1"/>
+                        </a:buClr>
+                        <a:buSzPts val="1100"/>
+                        <a:buFont typeface="Arial"/>
+                        <a:buNone/>
+                      </a:pPr>
+                      <a:r>
+                        <a:rPr lang="en-GB">
+                          <a:solidFill>
+                            <a:schemeClr val="dk1"/>
+                          </a:solidFill>
+                        </a:rPr>
+                        <a:t>90 : 10</a:t>
+                      </a:r>
+                      <a:endParaRPr>
+                        <a:solidFill>
+                          <a:schemeClr val="dk1"/>
+                        </a:solidFill>
+                      </a:endParaRPr>
+                    </a:p>
+                  </a:txBody>
+                  <a:tcPr marT="91425" marB="91425" marR="91425" marL="91425">
+                    <a:lnL cap="flat" cmpd="sng" w="9525">
+                      <a:solidFill>
+                        <a:srgbClr val="9E9E9E"/>
+                      </a:solidFill>
+                      <a:prstDash val="solid"/>
+                      <a:round/>
+                      <a:headEnd len="sm" w="sm" type="none"/>
+                      <a:tailEnd len="sm" w="sm" type="none"/>
+                    </a:lnL>
+                  </a:tcPr>
+                </a:tc>
+                <a:tc>
+                  <a:txBody>
+                    <a:bodyPr/>
+                    <a:lstStyle/>
+                    <a:p>
+                      <a:pPr indent="0" lvl="0" marL="0" rtl="0" algn="ctr">
+                        <a:spcBef>
+                          <a:spcPts val="0"/>
+                        </a:spcBef>
+                        <a:spcAft>
+                          <a:spcPts val="0"/>
+                        </a:spcAft>
+                        <a:buNone/>
+                      </a:pPr>
+                      <a:r>
+                        <a:rPr lang="en-GB">
+                          <a:solidFill>
+                            <a:schemeClr val="dk1"/>
+                          </a:solidFill>
+                        </a:rPr>
+                        <a:t>3.72</a:t>
+                      </a:r>
+                      <a:endParaRPr>
+                        <a:solidFill>
+                          <a:schemeClr val="dk1"/>
+                        </a:solidFill>
+                      </a:endParaRPr>
+                    </a:p>
+                  </a:txBody>
+                  <a:tcPr marT="91425" marB="91425" marR="91425" marL="91425"/>
+                </a:tc>
+                <a:tc>
+                  <a:txBody>
+                    <a:bodyPr/>
+                    <a:lstStyle/>
+                    <a:p>
+                      <a:pPr indent="0" lvl="0" marL="0" rtl="0" algn="ctr">
+                        <a:spcBef>
+                          <a:spcPts val="0"/>
+                        </a:spcBef>
+                        <a:spcAft>
+                          <a:spcPts val="0"/>
+                        </a:spcAft>
+                        <a:buNone/>
+                      </a:pPr>
+                      <a:r>
+                        <a:rPr lang="en-GB">
+                          <a:solidFill>
+                            <a:schemeClr val="dk1"/>
+                          </a:solidFill>
+                        </a:rPr>
+                        <a:t>------</a:t>
+                      </a:r>
+                      <a:endParaRPr>
+                        <a:solidFill>
+                          <a:schemeClr val="dk1"/>
+                        </a:solidFill>
+                      </a:endParaRPr>
+                    </a:p>
+                  </a:txBody>
+                  <a:tcPr marT="91425" marB="91425" marR="91425" marL="91425"/>
+                </a:tc>
+                <a:tc>
+                  <a:txBody>
+                    <a:bodyPr/>
+                    <a:lstStyle/>
+                    <a:p>
+                      <a:pPr indent="0" lvl="0" marL="0" rtl="0" algn="ctr">
+                        <a:spcBef>
+                          <a:spcPts val="0"/>
+                        </a:spcBef>
+                        <a:spcAft>
+                          <a:spcPts val="0"/>
+                        </a:spcAft>
+                        <a:buNone/>
+                      </a:pPr>
+                      <a:r>
+                        <a:rPr lang="en-GB">
+                          <a:solidFill>
+                            <a:schemeClr val="dk1"/>
+                          </a:solidFill>
+                        </a:rPr>
+                        <a:t>107.9</a:t>
+                      </a:r>
+                      <a:endParaRPr>
+                        <a:solidFill>
+                          <a:schemeClr val="dk1"/>
+                        </a:solidFill>
+                      </a:endParaRPr>
+                    </a:p>
+                  </a:txBody>
+                  <a:tcPr marT="91425" marB="91425" marR="91425" marL="91425"/>
+                </a:tc>
+              </a:tr>
+              <a:tr h="357750">
+                <a:tc>
+                  <a:txBody>
+                    <a:bodyPr/>
+                    <a:lstStyle/>
+                    <a:p>
+                      <a:pPr indent="0" lvl="0" marL="0" rtl="0" algn="l">
+                        <a:spcBef>
+                          <a:spcPts val="0"/>
+                        </a:spcBef>
+                        <a:spcAft>
+                          <a:spcPts val="0"/>
+                        </a:spcAft>
+                        <a:buClr>
+                          <a:schemeClr val="dk1"/>
+                        </a:buClr>
+                        <a:buSzPts val="1100"/>
+                        <a:buFont typeface="Arial"/>
+                        <a:buNone/>
+                      </a:pPr>
+                      <a:r>
+                        <a:rPr lang="en-GB">
+                          <a:solidFill>
+                            <a:schemeClr val="dk1"/>
+                          </a:solidFill>
+                        </a:rPr>
+                        <a:t>LSTM</a:t>
+                      </a:r>
+                      <a:endParaRPr/>
+                    </a:p>
+                  </a:txBody>
+                  <a:tcPr marT="91425" marB="91425" marR="91425" marL="91425"/>
+                </a:tc>
+                <a:tc>
+                  <a:txBody>
+                    <a:bodyPr/>
+                    <a:lstStyle/>
+                    <a:p>
+                      <a:pPr indent="0" lvl="0" marL="0" rtl="0" algn="l">
+                        <a:spcBef>
+                          <a:spcPts val="0"/>
+                        </a:spcBef>
+                        <a:spcAft>
+                          <a:spcPts val="0"/>
+                        </a:spcAft>
+                        <a:buClr>
+                          <a:schemeClr val="dk1"/>
+                        </a:buClr>
+                        <a:buSzPts val="1100"/>
+                        <a:buFont typeface="Arial"/>
+                        <a:buNone/>
+                      </a:pPr>
+                      <a:r>
+                        <a:rPr lang="en-GB">
+                          <a:solidFill>
+                            <a:schemeClr val="dk1"/>
+                          </a:solidFill>
+                        </a:rPr>
+                        <a:t>A</a:t>
+                      </a:r>
+                      <a:endParaRPr>
+                        <a:solidFill>
+                          <a:schemeClr val="dk1"/>
+                        </a:solidFill>
+                      </a:endParaRPr>
+                    </a:p>
+                  </a:txBody>
+                  <a:tcPr marT="91425" marB="91425" marR="91425" marL="91425">
+                    <a:lnR cap="flat" cmpd="sng" w="9525">
+                      <a:solidFill>
+                        <a:srgbClr val="9E9E9E"/>
+                      </a:solidFill>
+                      <a:prstDash val="solid"/>
+                      <a:round/>
+                      <a:headEnd len="sm" w="sm" type="none"/>
+                      <a:tailEnd len="sm" w="sm" type="none"/>
+                    </a:lnR>
+                  </a:tcPr>
+                </a:tc>
+                <a:tc>
+                  <a:txBody>
+                    <a:bodyPr/>
+                    <a:lstStyle/>
+                    <a:p>
+                      <a:pPr indent="0" lvl="0" marL="0" rtl="0" algn="l">
+                        <a:spcBef>
+                          <a:spcPts val="0"/>
+                        </a:spcBef>
+                        <a:spcAft>
+                          <a:spcPts val="0"/>
+                        </a:spcAft>
+                        <a:buNone/>
+                      </a:pPr>
+                      <a:r>
+                        <a:rPr lang="en-GB">
+                          <a:solidFill>
+                            <a:schemeClr val="dk1"/>
+                          </a:solidFill>
+                        </a:rPr>
+                        <a:t>3264</a:t>
+                      </a:r>
+                      <a:endParaRPr>
+                        <a:solidFill>
+                          <a:schemeClr val="dk1"/>
+                        </a:solidFill>
+                      </a:endParaRPr>
+                    </a:p>
+                  </a:txBody>
+                  <a:tcPr marT="91425" marB="91425" marR="91425" marL="91425">
+                    <a:lnL cap="flat" cmpd="sng" w="9525">
+                      <a:solidFill>
+                        <a:srgbClr val="9E9E9E"/>
+                      </a:solidFill>
+                      <a:prstDash val="solid"/>
+                      <a:round/>
+                      <a:headEnd len="sm" w="sm" type="none"/>
+                      <a:tailEnd len="sm" w="sm" type="none"/>
+                    </a:lnL>
+                    <a:lnR cap="flat" cmpd="sng" w="9525">
+                      <a:solidFill>
+                        <a:srgbClr val="9E9E9E"/>
+                      </a:solidFill>
+                      <a:prstDash val="solid"/>
+                      <a:round/>
+                      <a:headEnd len="sm" w="sm" type="none"/>
+                      <a:tailEnd len="sm" w="sm" type="none"/>
+                    </a:lnR>
+                    <a:lnT cap="flat" cmpd="sng" w="9525">
+                      <a:solidFill>
+                        <a:srgbClr val="9E9E9E"/>
+                      </a:solidFill>
+                      <a:prstDash val="solid"/>
+                      <a:round/>
+                      <a:headEnd len="sm" w="sm" type="none"/>
+                      <a:tailEnd len="sm" w="sm" type="none"/>
+                    </a:lnT>
+                    <a:lnB cap="flat" cmpd="sng" w="9525">
+                      <a:solidFill>
+                        <a:srgbClr val="9E9E9E"/>
+                      </a:solidFill>
+                      <a:prstDash val="solid"/>
+                      <a:round/>
+                      <a:headEnd len="sm" w="sm" type="none"/>
+                      <a:tailEnd len="sm" w="sm" type="none"/>
+                    </a:lnB>
+                  </a:tcPr>
+                </a:tc>
+                <a:tc>
+                  <a:txBody>
+                    <a:bodyPr/>
+                    <a:lstStyle/>
+                    <a:p>
+                      <a:pPr indent="0" lvl="0" marL="0" rtl="0" algn="l">
+                        <a:spcBef>
+                          <a:spcPts val="0"/>
+                        </a:spcBef>
+                        <a:spcAft>
+                          <a:spcPts val="0"/>
+                        </a:spcAft>
+                        <a:buClr>
+                          <a:schemeClr val="dk1"/>
+                        </a:buClr>
+                        <a:buSzPts val="1100"/>
+                        <a:buFont typeface="Arial"/>
+                        <a:buNone/>
+                      </a:pPr>
+                      <a:r>
+                        <a:rPr lang="en-GB">
+                          <a:solidFill>
+                            <a:schemeClr val="dk1"/>
+                          </a:solidFill>
+                        </a:rPr>
+                        <a:t>90 : 10</a:t>
+                      </a:r>
+                      <a:endParaRPr>
+                        <a:solidFill>
+                          <a:schemeClr val="dk1"/>
+                        </a:solidFill>
+                      </a:endParaRPr>
+                    </a:p>
+                  </a:txBody>
+                  <a:tcPr marT="91425" marB="91425" marR="91425" marL="91425">
+                    <a:lnL cap="flat" cmpd="sng" w="9525">
+                      <a:solidFill>
+                        <a:srgbClr val="9E9E9E"/>
+                      </a:solidFill>
+                      <a:prstDash val="solid"/>
+                      <a:round/>
+                      <a:headEnd len="sm" w="sm" type="none"/>
+                      <a:tailEnd len="sm" w="sm" type="none"/>
+                    </a:lnL>
+                  </a:tcPr>
+                </a:tc>
+                <a:tc>
+                  <a:txBody>
+                    <a:bodyPr/>
+                    <a:lstStyle/>
+                    <a:p>
+                      <a:pPr indent="0" lvl="0" marL="0" rtl="0" algn="ctr">
+                        <a:spcBef>
+                          <a:spcPts val="0"/>
+                        </a:spcBef>
+                        <a:spcAft>
+                          <a:spcPts val="0"/>
+                        </a:spcAft>
+                        <a:buNone/>
+                      </a:pPr>
+                      <a:r>
+                        <a:rPr lang="en-GB">
+                          <a:solidFill>
+                            <a:schemeClr val="dk1"/>
+                          </a:solidFill>
+                        </a:rPr>
+                        <a:t>8.5</a:t>
+                      </a:r>
+                      <a:endParaRPr>
+                        <a:solidFill>
+                          <a:schemeClr val="dk1"/>
+                        </a:solidFill>
+                      </a:endParaRPr>
+                    </a:p>
+                  </a:txBody>
+                  <a:tcPr marT="91425" marB="91425" marR="91425" marL="91425"/>
+                </a:tc>
+                <a:tc>
+                  <a:txBody>
+                    <a:bodyPr/>
+                    <a:lstStyle/>
+                    <a:p>
+                      <a:pPr indent="0" lvl="0" marL="0" rtl="0" algn="ctr">
+                        <a:spcBef>
+                          <a:spcPts val="0"/>
+                        </a:spcBef>
+                        <a:spcAft>
+                          <a:spcPts val="0"/>
+                        </a:spcAft>
+                        <a:buNone/>
+                      </a:pPr>
+                      <a:r>
+                        <a:rPr lang="en-GB">
+                          <a:solidFill>
+                            <a:schemeClr val="dk1"/>
+                          </a:solidFill>
+                        </a:rPr>
+                        <a:t>------</a:t>
+                      </a:r>
+                      <a:endParaRPr>
+                        <a:solidFill>
+                          <a:schemeClr val="dk1"/>
+                        </a:solidFill>
+                      </a:endParaRPr>
+                    </a:p>
+                  </a:txBody>
+                  <a:tcPr marT="91425" marB="91425" marR="91425" marL="91425"/>
+                </a:tc>
+                <a:tc>
+                  <a:txBody>
+                    <a:bodyPr/>
+                    <a:lstStyle/>
+                    <a:p>
+                      <a:pPr indent="0" lvl="0" marL="0" rtl="0" algn="ctr">
+                        <a:spcBef>
+                          <a:spcPts val="0"/>
+                        </a:spcBef>
+                        <a:spcAft>
+                          <a:spcPts val="0"/>
+                        </a:spcAft>
+                        <a:buNone/>
+                      </a:pPr>
+                      <a:r>
+                        <a:rPr lang="en-GB">
+                          <a:solidFill>
+                            <a:schemeClr val="dk1"/>
+                          </a:solidFill>
+                        </a:rPr>
+                        <a:t>36.74</a:t>
                       </a:r>
                       <a:endParaRPr>
                         <a:solidFill>
@@ -7561,7 +9032,7 @@
             </a:pPr>
             <a:r>
               <a:rPr lang="en-GB"/>
-              <a:t>To Do</a:t>
+              <a:t>Observation</a:t>
             </a:r>
             <a:endParaRPr/>
           </a:p>
@@ -7602,7 +9073,7 @@
             </a:pPr>
             <a:r>
               <a:rPr lang="en-GB"/>
-              <a:t>Use deep learning models e.g. lstm, gru, bidirectional lstm.</a:t>
+              <a:t>Model degrading when predicting too much in future. </a:t>
             </a:r>
             <a:endParaRPr/>
           </a:p>
@@ -7619,7 +9090,7 @@
             </a:pPr>
             <a:r>
               <a:rPr lang="en-GB"/>
-              <a:t>Use day data for model building.</a:t>
+              <a:t>Simple LSTM didn’t work well.</a:t>
             </a:r>
             <a:endParaRPr/>
           </a:p>
@@ -7654,6 +9125,137 @@
         <p:nvSpPr>
           <p:cNvPr id="132" name="Google Shape;132;p26"/>
           <p:cNvSpPr txBox="1"/>
+          <p:nvPr>
+            <p:ph type="title"/>
+          </p:nvPr>
+        </p:nvSpPr>
+        <p:spPr>
+          <a:xfrm>
+            <a:off x="311700" y="445025"/>
+            <a:ext cx="8520600" cy="572700"/>
+          </a:xfrm>
+          <a:prstGeom prst="rect">
+            <a:avLst/>
+          </a:prstGeom>
+        </p:spPr>
+        <p:txBody>
+          <a:bodyPr anchorCtr="0" anchor="t" bIns="91425" lIns="91425" spcFirstLastPara="1" rIns="91425" wrap="square" tIns="91425">
+            <a:noAutofit/>
+          </a:bodyPr>
+          <a:lstStyle/>
+          <a:p>
+            <a:pPr indent="0" lvl="0" marL="0" rtl="0" algn="l">
+              <a:spcBef>
+                <a:spcPts val="0"/>
+              </a:spcBef>
+              <a:spcAft>
+                <a:spcPts val="0"/>
+              </a:spcAft>
+              <a:buNone/>
+            </a:pPr>
+            <a:r>
+              <a:rPr lang="en-GB"/>
+              <a:t>To Do</a:t>
+            </a:r>
+            <a:endParaRPr/>
+          </a:p>
+        </p:txBody>
+      </p:sp>
+      <p:sp>
+        <p:nvSpPr>
+          <p:cNvPr id="133" name="Google Shape;133;p26"/>
+          <p:cNvSpPr txBox="1"/>
+          <p:nvPr>
+            <p:ph idx="1" type="body"/>
+          </p:nvPr>
+        </p:nvSpPr>
+        <p:spPr>
+          <a:xfrm>
+            <a:off x="311700" y="1152475"/>
+            <a:ext cx="8520600" cy="3416400"/>
+          </a:xfrm>
+          <a:prstGeom prst="rect">
+            <a:avLst/>
+          </a:prstGeom>
+        </p:spPr>
+        <p:txBody>
+          <a:bodyPr anchorCtr="0" anchor="t" bIns="91425" lIns="91425" spcFirstLastPara="1" rIns="91425" wrap="square" tIns="91425">
+            <a:noAutofit/>
+          </a:bodyPr>
+          <a:lstStyle/>
+          <a:p>
+            <a:pPr indent="-342900" lvl="0" marL="457200" rtl="0" algn="l">
+              <a:spcBef>
+                <a:spcPts val="0"/>
+              </a:spcBef>
+              <a:spcAft>
+                <a:spcPts val="0"/>
+              </a:spcAft>
+              <a:buSzPts val="1800"/>
+              <a:buChar char="●"/>
+            </a:pPr>
+            <a:r>
+              <a:rPr lang="en-GB"/>
+              <a:t>Use deep learning models e.g. bidirectional lstm, </a:t>
+            </a:r>
+            <a:r>
+              <a:rPr lang="en-GB"/>
+              <a:t>bidirectional </a:t>
+            </a:r>
+            <a:r>
+              <a:rPr lang="en-GB"/>
+              <a:t>gru.</a:t>
+            </a:r>
+            <a:endParaRPr/>
+          </a:p>
+          <a:p>
+            <a:pPr indent="-342900" lvl="0" marL="457200" rtl="0" algn="l">
+              <a:spcBef>
+                <a:spcPts val="0"/>
+              </a:spcBef>
+              <a:spcAft>
+                <a:spcPts val="0"/>
+              </a:spcAft>
+              <a:buSzPts val="1800"/>
+              <a:buChar char="●"/>
+            </a:pPr>
+            <a:r>
+              <a:rPr lang="en-GB"/>
+              <a:t>Use day data for model building.</a:t>
+            </a:r>
+            <a:endParaRPr/>
+          </a:p>
+        </p:txBody>
+      </p:sp>
+    </p:spTree>
+  </p:cSld>
+  <p:clrMapOvr>
+    <a:masterClrMapping/>
+  </p:clrMapOvr>
+</p:sld>
+</file>
+
+<file path=ppt/slides/slide14.xml><?xml version="1.0" encoding="utf-8"?>
+<p:sld xmlns:a="http://schemas.openxmlformats.org/drawingml/2006/main" xmlns:r="http://schemas.openxmlformats.org/officeDocument/2006/relationships" xmlns:mc="http://schemas.openxmlformats.org/markup-compatibility/2006" xmlns:mv="urn:schemas-microsoft-com:mac:vml" xmlns:p="http://schemas.openxmlformats.org/presentationml/2006/main" xmlns:c="http://schemas.openxmlformats.org/drawingml/2006/chart" xmlns:dgm="http://schemas.openxmlformats.org/drawingml/2006/diagram" xmlns:o="urn:schemas-microsoft-com:office:office" xmlns:v="urn:schemas-microsoft-com:vml" xmlns:pvml="urn:schemas-microsoft-com:office:powerpoint" xmlns:com="http://schemas.openxmlformats.org/drawingml/2006/compatibility" xmlns:p14="http://schemas.microsoft.com/office/powerpoint/2010/main" xmlns:p15="http://schemas.microsoft.com/office/powerpoint/2012/main">
+  <p:cSld>
+    <p:spTree>
+      <p:nvGrpSpPr>
+        <p:cNvPr id="137" name="Shape 137"/>
+        <p:cNvGrpSpPr/>
+        <p:nvPr/>
+      </p:nvGrpSpPr>
+      <p:grpSpPr>
+        <a:xfrm>
+          <a:off x="0" y="0"/>
+          <a:ext cx="0" cy="0"/>
+          <a:chOff x="0" y="0"/>
+          <a:chExt cx="0" cy="0"/>
+        </a:xfrm>
+      </p:grpSpPr>
+      <p:sp>
+        <p:nvSpPr>
+          <p:cNvPr id="138" name="Google Shape;138;p27"/>
+          <p:cNvSpPr txBox="1"/>
           <p:nvPr/>
         </p:nvSpPr>
         <p:spPr>
@@ -7745,20 +9347,11 @@
               <a:spcAft>
                 <a:spcPts val="0"/>
               </a:spcAft>
-              <a:buClr>
-                <a:schemeClr val="dk1"/>
-              </a:buClr>
-              <a:buSzPts val="1100"/>
-              <a:buFont typeface="Arial"/>
               <a:buNone/>
             </a:pPr>
             <a:r>
-              <a:rPr lang="en-GB" sz="1800">
-                <a:solidFill>
-                  <a:schemeClr val="dk1"/>
-                </a:solidFill>
-              </a:rPr>
-              <a:t>+918790527858</a:t>
+              <a:rPr lang="en-GB" sz="1800"/>
+              <a:t>+1 (917) 7401966</a:t>
             </a:r>
             <a:endParaRPr sz="1800"/>
           </a:p>
@@ -7962,6 +9555,23 @@
             <a:r>
               <a:rPr lang="en-GB"/>
               <a:t>ARIMA</a:t>
+            </a:r>
+            <a:endParaRPr/>
+          </a:p>
+          <a:p>
+            <a:pPr indent="-342900" lvl="0" marL="457200" rtl="0" algn="l">
+              <a:spcBef>
+                <a:spcPts val="0"/>
+              </a:spcBef>
+              <a:spcAft>
+                <a:spcPts val="0"/>
+              </a:spcAft>
+              <a:buSzPts val="1800"/>
+              <a:buChar char="●"/>
+            </a:pPr>
+            <a:r>
+              <a:rPr lang="en-GB"/>
+              <a:t>LSTM</a:t>
             </a:r>
             <a:endParaRPr/>
           </a:p>
@@ -8846,7 +10456,7 @@
             </a:pPr>
             <a:r>
               <a:rPr lang="en-GB"/>
-              <a:t>MSFT share price</a:t>
+              <a:t>Model : ARIMAX (Symbol : DAL)</a:t>
             </a:r>
             <a:endParaRPr/>
           </a:p>
@@ -8875,14 +10485,15 @@
           </a:bodyPr>
           <a:lstStyle/>
           <a:p>
-            <a:pPr indent="0" lvl="0" marL="0" rtl="0" algn="l">
-              <a:spcBef>
-                <a:spcPts val="0"/>
-              </a:spcBef>
-              <a:spcAft>
-                <a:spcPts val="1600"/>
-              </a:spcAft>
-              <a:buNone/>
+            <a:pPr indent="-342900" lvl="0" marL="457200" rtl="0" algn="l">
+              <a:spcBef>
+                <a:spcPts val="0"/>
+              </a:spcBef>
+              <a:spcAft>
+                <a:spcPts val="0"/>
+              </a:spcAft>
+              <a:buSzPts val="1800"/>
+              <a:buChar char="●"/>
             </a:pPr>
             <a:r>
               <a:t/>
@@ -8908,7 +10519,7 @@
         <p:spPr>
           <a:xfrm>
             <a:off x="311700" y="1152475"/>
-            <a:ext cx="8520599" cy="3416400"/>
+            <a:ext cx="8520600" cy="3416400"/>
           </a:xfrm>
           <a:prstGeom prst="rect">
             <a:avLst/>
@@ -8974,11 +10585,16 @@
               <a:spcAft>
                 <a:spcPts val="0"/>
               </a:spcAft>
+              <a:buClr>
+                <a:schemeClr val="dk1"/>
+              </a:buClr>
+              <a:buSzPts val="1100"/>
+              <a:buFont typeface="Arial"/>
               <a:buNone/>
             </a:pPr>
             <a:r>
               <a:rPr lang="en-GB"/>
-              <a:t>Model : ARIMAX (Symbol : DAL)</a:t>
+              <a:t>Model : ARIMAX (Symbol : MSFT)</a:t>
             </a:r>
             <a:endParaRPr/>
           </a:p>
@@ -9007,15 +10623,14 @@
           </a:bodyPr>
           <a:lstStyle/>
           <a:p>
-            <a:pPr indent="-342900" lvl="0" marL="457200" rtl="0" algn="l">
-              <a:spcBef>
-                <a:spcPts val="0"/>
-              </a:spcBef>
-              <a:spcAft>
-                <a:spcPts val="0"/>
-              </a:spcAft>
-              <a:buSzPts val="1800"/>
-              <a:buChar char="●"/>
+            <a:pPr indent="0" lvl="0" marL="0" rtl="0" algn="l">
+              <a:spcBef>
+                <a:spcPts val="0"/>
+              </a:spcBef>
+              <a:spcAft>
+                <a:spcPts val="1600"/>
+              </a:spcAft>
+              <a:buNone/>
             </a:pPr>
             <a:r>
               <a:t/>
@@ -9040,7 +10655,7 @@
         </p:blipFill>
         <p:spPr>
           <a:xfrm>
-            <a:off x="311701" y="1152475"/>
+            <a:off x="311700" y="1152475"/>
             <a:ext cx="8520601" cy="3416400"/>
           </a:xfrm>
           <a:prstGeom prst="rect">
@@ -9111,7 +10726,7 @@
             </a:pPr>
             <a:r>
               <a:rPr lang="en-GB"/>
-              <a:t>Model : ARIMAX (Symbol : AMZN)</a:t>
+              <a:t>Model : LSTM (Symbol : DAL)</a:t>
             </a:r>
             <a:endParaRPr/>
           </a:p>
@@ -9140,15 +10755,14 @@
           </a:bodyPr>
           <a:lstStyle/>
           <a:p>
-            <a:pPr indent="-342900" lvl="0" marL="457200" rtl="0" algn="l">
-              <a:spcBef>
-                <a:spcPts val="0"/>
-              </a:spcBef>
-              <a:spcAft>
-                <a:spcPts val="0"/>
-              </a:spcAft>
-              <a:buSzPts val="1800"/>
-              <a:buChar char="●"/>
+            <a:pPr indent="0" lvl="0" marL="0" rtl="0" algn="l">
+              <a:spcBef>
+                <a:spcPts val="0"/>
+              </a:spcBef>
+              <a:spcAft>
+                <a:spcPts val="1600"/>
+              </a:spcAft>
+              <a:buNone/>
             </a:pPr>
             <a:r>
               <a:t/>
@@ -9173,7 +10787,7 @@
         </p:blipFill>
         <p:spPr>
           <a:xfrm>
-            <a:off x="311701" y="1152475"/>
+            <a:off x="311700" y="1152475"/>
             <a:ext cx="8520601" cy="3416400"/>
           </a:xfrm>
           <a:prstGeom prst="rect">
@@ -9194,6 +10808,285 @@
 </file>
 
 <file path=ppt/theme/theme1.xml><?xml version="1.0" encoding="utf-8"?>
+<a:theme xmlns:a="http://schemas.openxmlformats.org/drawingml/2006/main" xmlns:r="http://schemas.openxmlformats.org/officeDocument/2006/relationships" name="Simple Light">
+  <a:themeElements>
+    <a:clrScheme name="Simple Light">
+      <a:dk1>
+        <a:srgbClr val="000000"/>
+      </a:dk1>
+      <a:lt1>
+        <a:srgbClr val="FFFFFF"/>
+      </a:lt1>
+      <a:dk2>
+        <a:srgbClr val="595959"/>
+      </a:dk2>
+      <a:lt2>
+        <a:srgbClr val="EEEEEE"/>
+      </a:lt2>
+      <a:accent1>
+        <a:srgbClr val="FFAB40"/>
+      </a:accent1>
+      <a:accent2>
+        <a:srgbClr val="212121"/>
+      </a:accent2>
+      <a:accent3>
+        <a:srgbClr val="78909C"/>
+      </a:accent3>
+      <a:accent4>
+        <a:srgbClr val="FFAB40"/>
+      </a:accent4>
+      <a:accent5>
+        <a:srgbClr val="0097A7"/>
+      </a:accent5>
+      <a:accent6>
+        <a:srgbClr val="EEFF41"/>
+      </a:accent6>
+      <a:hlink>
+        <a:srgbClr val="0097A7"/>
+      </a:hlink>
+      <a:folHlink>
+        <a:srgbClr val="0097A7"/>
+      </a:folHlink>
+    </a:clrScheme>
+    <a:fontScheme name="Office">
+      <a:majorFont>
+        <a:latin typeface="Arial"/>
+        <a:ea typeface=""/>
+        <a:cs typeface=""/>
+        <a:font script="Jpan" typeface="ＭＳ Ｐゴシック"/>
+        <a:font script="Hang" typeface="맑은 고딕"/>
+        <a:font script="Hans" typeface="宋体"/>
+        <a:font script="Hant" typeface="新細明體"/>
+        <a:font script="Arab" typeface="Times New Roman"/>
+        <a:font script="Hebr" typeface="Times New Roman"/>
+        <a:font script="Thai" typeface="Angsana New"/>
+        <a:font script="Ethi" typeface="Nyala"/>
+        <a:font script="Beng" typeface="Vrinda"/>
+        <a:font script="Gujr" typeface="Shruti"/>
+        <a:font script="Khmr" typeface="MoolBoran"/>
+        <a:font script="Knda" typeface="Tunga"/>
+        <a:font script="Guru" typeface="Raavi"/>
+        <a:font script="Cans" typeface="Euphemia"/>
+        <a:font script="Cher" typeface="Plantagenet Cherokee"/>
+        <a:font script="Yiii" typeface="Microsoft Yi Baiti"/>
+        <a:font script="Tibt" typeface="Microsoft Himalaya"/>
+        <a:font script="Thaa" typeface="MV Boli"/>
+        <a:font script="Deva" typeface="Mangal"/>
+        <a:font script="Telu" typeface="Gautami"/>
+        <a:font script="Taml" typeface="Latha"/>
+        <a:font script="Syrc" typeface="Estrangelo Edessa"/>
+        <a:font script="Orya" typeface="Kalinga"/>
+        <a:font script="Mlym" typeface="Kartika"/>
+        <a:font script="Laoo" typeface="DokChampa"/>
+        <a:font script="Sinh" typeface="Iskoola Pota"/>
+        <a:font script="Mong" typeface="Mongolian Baiti"/>
+        <a:font script="Viet" typeface="Times New Roman"/>
+        <a:font script="Uigh" typeface="Microsoft Uighur"/>
+        <a:font script="Geor" typeface="Sylfaen"/>
+      </a:majorFont>
+      <a:minorFont>
+        <a:latin typeface="Arial"/>
+        <a:ea typeface=""/>
+        <a:cs typeface=""/>
+        <a:font script="Jpan" typeface="ＭＳ Ｐゴシック"/>
+        <a:font script="Hang" typeface="맑은 고딕"/>
+        <a:font script="Hans" typeface="宋体"/>
+        <a:font script="Hant" typeface="新細明體"/>
+        <a:font script="Arab" typeface="Arial"/>
+        <a:font script="Hebr" typeface="Arial"/>
+        <a:font script="Thai" typeface="Cordia New"/>
+        <a:font script="Ethi" typeface="Nyala"/>
+        <a:font script="Beng" typeface="Vrinda"/>
+        <a:font script="Gujr" typeface="Shruti"/>
+        <a:font script="Khmr" typeface="DaunPenh"/>
+        <a:font script="Knda" typeface="Tunga"/>
+        <a:font script="Guru" typeface="Raavi"/>
+        <a:font script="Cans" typeface="Euphemia"/>
+        <a:font script="Cher" typeface="Plantagenet Cherokee"/>
+        <a:font script="Yiii" typeface="Microsoft Yi Baiti"/>
+        <a:font script="Tibt" typeface="Microsoft Himalaya"/>
+        <a:font script="Thaa" typeface="MV Boli"/>
+        <a:font script="Deva" typeface="Mangal"/>
+        <a:font script="Telu" typeface="Gautami"/>
+        <a:font script="Taml" typeface="Latha"/>
+        <a:font script="Syrc" typeface="Estrangelo Edessa"/>
+        <a:font script="Orya" typeface="Kalinga"/>
+        <a:font script="Mlym" typeface="Kartika"/>
+        <a:font script="Laoo" typeface="DokChampa"/>
+        <a:font script="Sinh" typeface="Iskoola Pota"/>
+        <a:font script="Mong" typeface="Mongolian Baiti"/>
+        <a:font script="Viet" typeface="Arial"/>
+        <a:font script="Uigh" typeface="Microsoft Uighur"/>
+        <a:font script="Geor" typeface="Sylfaen"/>
+      </a:minorFont>
+    </a:fontScheme>
+    <a:fmtScheme name="Office">
+      <a:fillStyleLst>
+        <a:solidFill>
+          <a:schemeClr val="phClr"/>
+        </a:solidFill>
+        <a:gradFill rotWithShape="1">
+          <a:gsLst>
+            <a:gs pos="0">
+              <a:schemeClr val="phClr">
+                <a:tint val="50000"/>
+                <a:satMod val="300000"/>
+              </a:schemeClr>
+            </a:gs>
+            <a:gs pos="35000">
+              <a:schemeClr val="phClr">
+                <a:tint val="37000"/>
+                <a:satMod val="300000"/>
+              </a:schemeClr>
+            </a:gs>
+            <a:gs pos="100000">
+              <a:schemeClr val="phClr">
+                <a:tint val="15000"/>
+                <a:satMod val="350000"/>
+              </a:schemeClr>
+            </a:gs>
+          </a:gsLst>
+          <a:lin ang="16200000" scaled="1"/>
+        </a:gradFill>
+        <a:gradFill rotWithShape="1">
+          <a:gsLst>
+            <a:gs pos="0">
+              <a:schemeClr val="phClr">
+                <a:tint val="100000"/>
+                <a:shade val="100000"/>
+                <a:satMod val="130000"/>
+              </a:schemeClr>
+            </a:gs>
+            <a:gs pos="100000">
+              <a:schemeClr val="phClr">
+                <a:tint val="50000"/>
+                <a:shade val="100000"/>
+                <a:satMod val="350000"/>
+              </a:schemeClr>
+            </a:gs>
+          </a:gsLst>
+          <a:lin ang="16200000" scaled="0"/>
+        </a:gradFill>
+      </a:fillStyleLst>
+      <a:lnStyleLst>
+        <a:ln w="9525" cap="flat" cmpd="sng" algn="ctr">
+          <a:solidFill>
+            <a:schemeClr val="phClr">
+              <a:shade val="95000"/>
+              <a:satMod val="105000"/>
+            </a:schemeClr>
+          </a:solidFill>
+          <a:prstDash val="solid"/>
+        </a:ln>
+        <a:ln w="25400" cap="flat" cmpd="sng" algn="ctr">
+          <a:solidFill>
+            <a:schemeClr val="phClr"/>
+          </a:solidFill>
+          <a:prstDash val="solid"/>
+        </a:ln>
+        <a:ln w="38100" cap="flat" cmpd="sng" algn="ctr">
+          <a:solidFill>
+            <a:schemeClr val="phClr"/>
+          </a:solidFill>
+          <a:prstDash val="solid"/>
+        </a:ln>
+      </a:lnStyleLst>
+      <a:effectStyleLst>
+        <a:effectStyle>
+          <a:effectLst>
+            <a:outerShdw blurRad="40000" dist="20000" dir="5400000" rotWithShape="0">
+              <a:srgbClr val="000000">
+                <a:alpha val="38000"/>
+              </a:srgbClr>
+            </a:outerShdw>
+          </a:effectLst>
+        </a:effectStyle>
+        <a:effectStyle>
+          <a:effectLst>
+            <a:outerShdw blurRad="40000" dist="23000" dir="5400000" rotWithShape="0">
+              <a:srgbClr val="000000">
+                <a:alpha val="35000"/>
+              </a:srgbClr>
+            </a:outerShdw>
+          </a:effectLst>
+        </a:effectStyle>
+        <a:effectStyle>
+          <a:effectLst>
+            <a:outerShdw blurRad="40000" dist="23000" dir="5400000" rotWithShape="0">
+              <a:srgbClr val="000000">
+                <a:alpha val="35000"/>
+              </a:srgbClr>
+            </a:outerShdw>
+          </a:effectLst>
+          <a:scene3d>
+            <a:camera prst="orthographicFront">
+              <a:rot lat="0" lon="0" rev="0"/>
+            </a:camera>
+            <a:lightRig rig="threePt" dir="t">
+              <a:rot lat="0" lon="0" rev="1200000"/>
+            </a:lightRig>
+          </a:scene3d>
+          <a:sp3d>
+            <a:bevelT w="63500" h="25400"/>
+          </a:sp3d>
+        </a:effectStyle>
+      </a:effectStyleLst>
+      <a:bgFillStyleLst>
+        <a:solidFill>
+          <a:schemeClr val="phClr"/>
+        </a:solidFill>
+        <a:gradFill rotWithShape="1">
+          <a:gsLst>
+            <a:gs pos="0">
+              <a:schemeClr val="phClr">
+                <a:tint val="40000"/>
+                <a:satMod val="350000"/>
+              </a:schemeClr>
+            </a:gs>
+            <a:gs pos="40000">
+              <a:schemeClr val="phClr">
+                <a:tint val="45000"/>
+                <a:shade val="99000"/>
+                <a:satMod val="350000"/>
+              </a:schemeClr>
+            </a:gs>
+            <a:gs pos="100000">
+              <a:schemeClr val="phClr">
+                <a:shade val="20000"/>
+                <a:satMod val="255000"/>
+              </a:schemeClr>
+            </a:gs>
+          </a:gsLst>
+          <a:path path="circle">
+            <a:fillToRect l="50000" t="-80000" r="50000" b="180000"/>
+          </a:path>
+        </a:gradFill>
+        <a:gradFill rotWithShape="1">
+          <a:gsLst>
+            <a:gs pos="0">
+              <a:schemeClr val="phClr">
+                <a:tint val="80000"/>
+                <a:satMod val="300000"/>
+              </a:schemeClr>
+            </a:gs>
+            <a:gs pos="100000">
+              <a:schemeClr val="phClr">
+                <a:shade val="30000"/>
+                <a:satMod val="200000"/>
+              </a:schemeClr>
+            </a:gs>
+          </a:gsLst>
+          <a:path path="circle">
+            <a:fillToRect l="50000" t="50000" r="50000" b="50000"/>
+          </a:path>
+        </a:gradFill>
+      </a:bgFillStyleLst>
+    </a:fmtScheme>
+  </a:themeElements>
+</a:theme>
+</file>
+
+<file path=ppt/theme/theme2.xml><?xml version="1.0" encoding="utf-8"?>
 <a:theme xmlns:a="http://schemas.openxmlformats.org/drawingml/2006/main" xmlns:r="http://schemas.openxmlformats.org/officeDocument/2006/relationships">
   <a:themeElements>
     <a:clrScheme name="Default">
@@ -9470,283 +11363,4 @@
     </a:fmtScheme>
   </a:themeElements>
 </a:theme>
-</file>
-
-<file path=ppt/theme/theme2.xml><?xml version="1.0" encoding="utf-8"?>
-<a:theme xmlns:a="http://schemas.openxmlformats.org/drawingml/2006/main" xmlns:r="http://schemas.openxmlformats.org/officeDocument/2006/relationships" name="Simple Light">
-  <a:themeElements>
-    <a:clrScheme name="Simple Light">
-      <a:dk1>
-        <a:srgbClr val="000000"/>
-      </a:dk1>
-      <a:lt1>
-        <a:srgbClr val="FFFFFF"/>
-      </a:lt1>
-      <a:dk2>
-        <a:srgbClr val="595959"/>
-      </a:dk2>
-      <a:lt2>
-        <a:srgbClr val="EEEEEE"/>
-      </a:lt2>
-      <a:accent1>
-        <a:srgbClr val="FFAB40"/>
-      </a:accent1>
-      <a:accent2>
-        <a:srgbClr val="212121"/>
-      </a:accent2>
-      <a:accent3>
-        <a:srgbClr val="78909C"/>
-      </a:accent3>
-      <a:accent4>
-        <a:srgbClr val="FFAB40"/>
-      </a:accent4>
-      <a:accent5>
-        <a:srgbClr val="0097A7"/>
-      </a:accent5>
-      <a:accent6>
-        <a:srgbClr val="EEFF41"/>
-      </a:accent6>
-      <a:hlink>
-        <a:srgbClr val="0097A7"/>
-      </a:hlink>
-      <a:folHlink>
-        <a:srgbClr val="0097A7"/>
-      </a:folHlink>
-    </a:clrScheme>
-    <a:fontScheme name="Office">
-      <a:majorFont>
-        <a:latin typeface="Arial"/>
-        <a:ea typeface=""/>
-        <a:cs typeface=""/>
-        <a:font script="Jpan" typeface="ＭＳ Ｐゴシック"/>
-        <a:font script="Hang" typeface="맑은 고딕"/>
-        <a:font script="Hans" typeface="宋体"/>
-        <a:font script="Hant" typeface="新細明體"/>
-        <a:font script="Arab" typeface="Times New Roman"/>
-        <a:font script="Hebr" typeface="Times New Roman"/>
-        <a:font script="Thai" typeface="Angsana New"/>
-        <a:font script="Ethi" typeface="Nyala"/>
-        <a:font script="Beng" typeface="Vrinda"/>
-        <a:font script="Gujr" typeface="Shruti"/>
-        <a:font script="Khmr" typeface="MoolBoran"/>
-        <a:font script="Knda" typeface="Tunga"/>
-        <a:font script="Guru" typeface="Raavi"/>
-        <a:font script="Cans" typeface="Euphemia"/>
-        <a:font script="Cher" typeface="Plantagenet Cherokee"/>
-        <a:font script="Yiii" typeface="Microsoft Yi Baiti"/>
-        <a:font script="Tibt" typeface="Microsoft Himalaya"/>
-        <a:font script="Thaa" typeface="MV Boli"/>
-        <a:font script="Deva" typeface="Mangal"/>
-        <a:font script="Telu" typeface="Gautami"/>
-        <a:font script="Taml" typeface="Latha"/>
-        <a:font script="Syrc" typeface="Estrangelo Edessa"/>
-        <a:font script="Orya" typeface="Kalinga"/>
-        <a:font script="Mlym" typeface="Kartika"/>
-        <a:font script="Laoo" typeface="DokChampa"/>
-        <a:font script="Sinh" typeface="Iskoola Pota"/>
-        <a:font script="Mong" typeface="Mongolian Baiti"/>
-        <a:font script="Viet" typeface="Times New Roman"/>
-        <a:font script="Uigh" typeface="Microsoft Uighur"/>
-        <a:font script="Geor" typeface="Sylfaen"/>
-      </a:majorFont>
-      <a:minorFont>
-        <a:latin typeface="Arial"/>
-        <a:ea typeface=""/>
-        <a:cs typeface=""/>
-        <a:font script="Jpan" typeface="ＭＳ Ｐゴシック"/>
-        <a:font script="Hang" typeface="맑은 고딕"/>
-        <a:font script="Hans" typeface="宋体"/>
-        <a:font script="Hant" typeface="新細明體"/>
-        <a:font script="Arab" typeface="Arial"/>
-        <a:font script="Hebr" typeface="Arial"/>
-        <a:font script="Thai" typeface="Cordia New"/>
-        <a:font script="Ethi" typeface="Nyala"/>
-        <a:font script="Beng" typeface="Vrinda"/>
-        <a:font script="Gujr" typeface="Shruti"/>
-        <a:font script="Khmr" typeface="DaunPenh"/>
-        <a:font script="Knda" typeface="Tunga"/>
-        <a:font script="Guru" typeface="Raavi"/>
-        <a:font script="Cans" typeface="Euphemia"/>
-        <a:font script="Cher" typeface="Plantagenet Cherokee"/>
-        <a:font script="Yiii" typeface="Microsoft Yi Baiti"/>
-        <a:font script="Tibt" typeface="Microsoft Himalaya"/>
-        <a:font script="Thaa" typeface="MV Boli"/>
-        <a:font script="Deva" typeface="Mangal"/>
-        <a:font script="Telu" typeface="Gautami"/>
-        <a:font script="Taml" typeface="Latha"/>
-        <a:font script="Syrc" typeface="Estrangelo Edessa"/>
-        <a:font script="Orya" typeface="Kalinga"/>
-        <a:font script="Mlym" typeface="Kartika"/>
-        <a:font script="Laoo" typeface="DokChampa"/>
-        <a:font script="Sinh" typeface="Iskoola Pota"/>
-        <a:font script="Mong" typeface="Mongolian Baiti"/>
-        <a:font script="Viet" typeface="Arial"/>
-        <a:font script="Uigh" typeface="Microsoft Uighur"/>
-        <a:font script="Geor" typeface="Sylfaen"/>
-      </a:minorFont>
-    </a:fontScheme>
-    <a:fmtScheme name="Office">
-      <a:fillStyleLst>
-        <a:solidFill>
-          <a:schemeClr val="phClr"/>
-        </a:solidFill>
-        <a:gradFill rotWithShape="1">
-          <a:gsLst>
-            <a:gs pos="0">
-              <a:schemeClr val="phClr">
-                <a:tint val="50000"/>
-                <a:satMod val="300000"/>
-              </a:schemeClr>
-            </a:gs>
-            <a:gs pos="35000">
-              <a:schemeClr val="phClr">
-                <a:tint val="37000"/>
-                <a:satMod val="300000"/>
-              </a:schemeClr>
-            </a:gs>
-            <a:gs pos="100000">
-              <a:schemeClr val="phClr">
-                <a:tint val="15000"/>
-                <a:satMod val="350000"/>
-              </a:schemeClr>
-            </a:gs>
-          </a:gsLst>
-          <a:lin ang="16200000" scaled="1"/>
-        </a:gradFill>
-        <a:gradFill rotWithShape="1">
-          <a:gsLst>
-            <a:gs pos="0">
-              <a:schemeClr val="phClr">
-                <a:tint val="100000"/>
-                <a:shade val="100000"/>
-                <a:satMod val="130000"/>
-              </a:schemeClr>
-            </a:gs>
-            <a:gs pos="100000">
-              <a:schemeClr val="phClr">
-                <a:tint val="50000"/>
-                <a:shade val="100000"/>
-                <a:satMod val="350000"/>
-              </a:schemeClr>
-            </a:gs>
-          </a:gsLst>
-          <a:lin ang="16200000" scaled="0"/>
-        </a:gradFill>
-      </a:fillStyleLst>
-      <a:lnStyleLst>
-        <a:ln w="9525" cap="flat" cmpd="sng" algn="ctr">
-          <a:solidFill>
-            <a:schemeClr val="phClr">
-              <a:shade val="95000"/>
-              <a:satMod val="105000"/>
-            </a:schemeClr>
-          </a:solidFill>
-          <a:prstDash val="solid"/>
-        </a:ln>
-        <a:ln w="25400" cap="flat" cmpd="sng" algn="ctr">
-          <a:solidFill>
-            <a:schemeClr val="phClr"/>
-          </a:solidFill>
-          <a:prstDash val="solid"/>
-        </a:ln>
-        <a:ln w="38100" cap="flat" cmpd="sng" algn="ctr">
-          <a:solidFill>
-            <a:schemeClr val="phClr"/>
-          </a:solidFill>
-          <a:prstDash val="solid"/>
-        </a:ln>
-      </a:lnStyleLst>
-      <a:effectStyleLst>
-        <a:effectStyle>
-          <a:effectLst>
-            <a:outerShdw blurRad="40000" dist="20000" dir="5400000" rotWithShape="0">
-              <a:srgbClr val="000000">
-                <a:alpha val="38000"/>
-              </a:srgbClr>
-            </a:outerShdw>
-          </a:effectLst>
-        </a:effectStyle>
-        <a:effectStyle>
-          <a:effectLst>
-            <a:outerShdw blurRad="40000" dist="23000" dir="5400000" rotWithShape="0">
-              <a:srgbClr val="000000">
-                <a:alpha val="35000"/>
-              </a:srgbClr>
-            </a:outerShdw>
-          </a:effectLst>
-        </a:effectStyle>
-        <a:effectStyle>
-          <a:effectLst>
-            <a:outerShdw blurRad="40000" dist="23000" dir="5400000" rotWithShape="0">
-              <a:srgbClr val="000000">
-                <a:alpha val="35000"/>
-              </a:srgbClr>
-            </a:outerShdw>
-          </a:effectLst>
-          <a:scene3d>
-            <a:camera prst="orthographicFront">
-              <a:rot lat="0" lon="0" rev="0"/>
-            </a:camera>
-            <a:lightRig rig="threePt" dir="t">
-              <a:rot lat="0" lon="0" rev="1200000"/>
-            </a:lightRig>
-          </a:scene3d>
-          <a:sp3d>
-            <a:bevelT w="63500" h="25400"/>
-          </a:sp3d>
-        </a:effectStyle>
-      </a:effectStyleLst>
-      <a:bgFillStyleLst>
-        <a:solidFill>
-          <a:schemeClr val="phClr"/>
-        </a:solidFill>
-        <a:gradFill rotWithShape="1">
-          <a:gsLst>
-            <a:gs pos="0">
-              <a:schemeClr val="phClr">
-                <a:tint val="40000"/>
-                <a:satMod val="350000"/>
-              </a:schemeClr>
-            </a:gs>
-            <a:gs pos="40000">
-              <a:schemeClr val="phClr">
-                <a:tint val="45000"/>
-                <a:shade val="99000"/>
-                <a:satMod val="350000"/>
-              </a:schemeClr>
-            </a:gs>
-            <a:gs pos="100000">
-              <a:schemeClr val="phClr">
-                <a:shade val="20000"/>
-                <a:satMod val="255000"/>
-              </a:schemeClr>
-            </a:gs>
-          </a:gsLst>
-          <a:path path="circle">
-            <a:fillToRect l="50000" t="-80000" r="50000" b="180000"/>
-          </a:path>
-        </a:gradFill>
-        <a:gradFill rotWithShape="1">
-          <a:gsLst>
-            <a:gs pos="0">
-              <a:schemeClr val="phClr">
-                <a:tint val="80000"/>
-                <a:satMod val="300000"/>
-              </a:schemeClr>
-            </a:gs>
-            <a:gs pos="100000">
-              <a:schemeClr val="phClr">
-                <a:shade val="30000"/>
-                <a:satMod val="200000"/>
-              </a:schemeClr>
-            </a:gs>
-          </a:gsLst>
-          <a:path path="circle">
-            <a:fillToRect l="50000" t="50000" r="50000" b="50000"/>
-          </a:path>
-        </a:gradFill>
-      </a:bgFillStyleLst>
-    </a:fmtScheme>
-  </a:themeElements>
-</a:theme>
 </file>
</xml_diff>